<commit_message>
Update to power point material
</commit_message>
<xml_diff>
--- a/Python Introduction.pptx
+++ b/Python Introduction.pptx
@@ -25,6 +25,9 @@
     <p:sldId id="273" r:id="rId19"/>
     <p:sldId id="269" r:id="rId20"/>
     <p:sldId id="271" r:id="rId21"/>
+    <p:sldId id="276" r:id="rId22"/>
+    <p:sldId id="278" r:id="rId23"/>
+    <p:sldId id="277" r:id="rId24"/>
   </p:sldIdLst>
   <p:sldSz cx="12192000" cy="6858000"/>
   <p:notesSz cx="6858000" cy="9144000"/>
@@ -317,7 +320,7 @@
           <a:p>
             <a:fld id="{4AAD347D-5ACD-4C99-B74B-A9C85AD731AF}" type="datetimeFigureOut">
               <a:rPr lang="en-US" dirty="0"/>
-              <a:t>9/8/2017</a:t>
+              <a:t>9/27/2017</a:t>
             </a:fld>
             <a:endParaRPr lang="en-US" dirty="0"/>
           </a:p>
@@ -587,7 +590,7 @@
           <a:p>
             <a:fld id="{4509A250-FF31-4206-8172-F9D3106AACB1}" type="datetimeFigureOut">
               <a:rPr lang="en-US" dirty="0"/>
-              <a:t>9/8/2017</a:t>
+              <a:t>9/27/2017</a:t>
             </a:fld>
             <a:endParaRPr lang="en-US" dirty="0"/>
           </a:p>
@@ -776,7 +779,7 @@
           <a:p>
             <a:fld id="{4509A250-FF31-4206-8172-F9D3106AACB1}" type="datetimeFigureOut">
               <a:rPr lang="en-US" dirty="0"/>
-              <a:t>9/8/2017</a:t>
+              <a:t>9/27/2017</a:t>
             </a:fld>
             <a:endParaRPr lang="en-US" dirty="0"/>
           </a:p>
@@ -1042,7 +1045,7 @@
           <a:p>
             <a:fld id="{4509A250-FF31-4206-8172-F9D3106AACB1}" type="datetimeFigureOut">
               <a:rPr lang="en-US" dirty="0"/>
-              <a:t>9/8/2017</a:t>
+              <a:t>9/27/2017</a:t>
             </a:fld>
             <a:endParaRPr lang="en-US" dirty="0"/>
           </a:p>
@@ -1364,7 +1367,7 @@
           <a:p>
             <a:fld id="{4509A250-FF31-4206-8172-F9D3106AACB1}" type="datetimeFigureOut">
               <a:rPr lang="en-US" dirty="0"/>
-              <a:t>9/8/2017</a:t>
+              <a:t>9/27/2017</a:t>
             </a:fld>
             <a:endParaRPr lang="en-US" dirty="0"/>
           </a:p>
@@ -1978,7 +1981,7 @@
           <a:p>
             <a:fld id="{4509A250-FF31-4206-8172-F9D3106AACB1}" type="datetimeFigureOut">
               <a:rPr lang="en-US" dirty="0"/>
-              <a:t>9/8/2017</a:t>
+              <a:t>9/27/2017</a:t>
             </a:fld>
             <a:endParaRPr lang="en-US" dirty="0"/>
           </a:p>
@@ -2820,7 +2823,7 @@
           <a:p>
             <a:fld id="{4509A250-FF31-4206-8172-F9D3106AACB1}" type="datetimeFigureOut">
               <a:rPr lang="en-US" dirty="0"/>
-              <a:t>9/8/2017</a:t>
+              <a:t>9/27/2017</a:t>
             </a:fld>
             <a:endParaRPr lang="en-US" dirty="0"/>
           </a:p>
@@ -2985,7 +2988,7 @@
           <a:p>
             <a:fld id="{4509A250-FF31-4206-8172-F9D3106AACB1}" type="datetimeFigureOut">
               <a:rPr lang="en-US" dirty="0"/>
-              <a:t>9/8/2017</a:t>
+              <a:t>9/27/2017</a:t>
             </a:fld>
             <a:endParaRPr lang="en-US" dirty="0"/>
           </a:p>
@@ -3160,7 +3163,7 @@
           <a:p>
             <a:fld id="{4509A250-FF31-4206-8172-F9D3106AACB1}" type="datetimeFigureOut">
               <a:rPr lang="en-US" dirty="0"/>
-              <a:t>9/8/2017</a:t>
+              <a:t>9/27/2017</a:t>
             </a:fld>
             <a:endParaRPr lang="en-US" dirty="0"/>
           </a:p>
@@ -3325,7 +3328,7 @@
           <a:p>
             <a:fld id="{9796027F-7875-4030-9381-8BD8C4F21935}" type="datetimeFigureOut">
               <a:rPr lang="en-US" dirty="0"/>
-              <a:t>9/8/2017</a:t>
+              <a:t>9/27/2017</a:t>
             </a:fld>
             <a:endParaRPr lang="en-US" dirty="0"/>
           </a:p>
@@ -3567,7 +3570,7 @@
           <a:p>
             <a:fld id="{9796027F-7875-4030-9381-8BD8C4F21935}" type="datetimeFigureOut">
               <a:rPr lang="en-US" dirty="0"/>
-              <a:t>9/8/2017</a:t>
+              <a:t>9/27/2017</a:t>
             </a:fld>
             <a:endParaRPr lang="en-US" dirty="0"/>
           </a:p>
@@ -3854,7 +3857,7 @@
           <a:p>
             <a:fld id="{9796027F-7875-4030-9381-8BD8C4F21935}" type="datetimeFigureOut">
               <a:rPr lang="en-US" dirty="0"/>
-              <a:t>9/8/2017</a:t>
+              <a:t>9/27/2017</a:t>
             </a:fld>
             <a:endParaRPr lang="en-US" dirty="0"/>
           </a:p>
@@ -4293,7 +4296,7 @@
           <a:p>
             <a:fld id="{9796027F-7875-4030-9381-8BD8C4F21935}" type="datetimeFigureOut">
               <a:rPr lang="en-US" dirty="0"/>
-              <a:t>9/8/2017</a:t>
+              <a:t>9/27/2017</a:t>
             </a:fld>
             <a:endParaRPr lang="en-US" dirty="0"/>
           </a:p>
@@ -4406,7 +4409,7 @@
           <a:p>
             <a:fld id="{4509A250-FF31-4206-8172-F9D3106AACB1}" type="datetimeFigureOut">
               <a:rPr lang="en-US" dirty="0"/>
-              <a:t>9/8/2017</a:t>
+              <a:t>9/27/2017</a:t>
             </a:fld>
             <a:endParaRPr lang="en-US" dirty="0"/>
           </a:p>
@@ -4496,7 +4499,7 @@
           <a:p>
             <a:fld id="{4509A250-FF31-4206-8172-F9D3106AACB1}" type="datetimeFigureOut">
               <a:rPr lang="en-US" dirty="0"/>
-              <a:t>9/8/2017</a:t>
+              <a:t>9/27/2017</a:t>
             </a:fld>
             <a:endParaRPr lang="en-US" dirty="0"/>
           </a:p>
@@ -4770,7 +4773,7 @@
           <a:p>
             <a:fld id="{4509A250-FF31-4206-8172-F9D3106AACB1}" type="datetimeFigureOut">
               <a:rPr lang="en-US" dirty="0"/>
-              <a:t>9/8/2017</a:t>
+              <a:t>9/27/2017</a:t>
             </a:fld>
             <a:endParaRPr lang="en-US" dirty="0"/>
           </a:p>
@@ -5040,7 +5043,7 @@
           <a:p>
             <a:fld id="{4509A250-FF31-4206-8172-F9D3106AACB1}" type="datetimeFigureOut">
               <a:rPr lang="en-US" dirty="0"/>
-              <a:t>9/8/2017</a:t>
+              <a:t>9/27/2017</a:t>
             </a:fld>
             <a:endParaRPr lang="en-US" dirty="0"/>
           </a:p>
@@ -5458,7 +5461,7 @@
           <a:p>
             <a:fld id="{4AAD347D-5ACD-4C99-B74B-A9C85AD731AF}" type="datetimeFigureOut">
               <a:rPr lang="en-US" dirty="0"/>
-              <a:t>9/8/2017</a:t>
+              <a:t>9/27/2017</a:t>
             </a:fld>
             <a:endParaRPr lang="en-US" dirty="0"/>
           </a:p>
@@ -6082,7 +6085,9 @@
         </p:nvSpPr>
         <p:spPr/>
         <p:txBody>
-          <a:bodyPr/>
+          <a:bodyPr>
+            <a:normAutofit lnSpcReduction="10000"/>
+          </a:bodyPr>
           <a:lstStyle/>
           <a:p>
             <a:r>
@@ -6157,6 +6162,13 @@
               <a:t>AppCode</a:t>
             </a:r>
             <a:endParaRPr lang="en-US" dirty="0" smtClean="0"/>
+          </a:p>
+          <a:p>
+            <a:pPr marL="800100" lvl="1"/>
+            <a:r>
+              <a:rPr lang="en-US" dirty="0" smtClean="0"/>
+              <a:t>Allows you to choose Python version if your system has more than one.</a:t>
+            </a:r>
           </a:p>
           <a:p>
             <a:pPr marL="400050"/>
@@ -6279,8 +6291,20 @@
             <a:pPr lvl="1"/>
             <a:r>
               <a:rPr lang="en-US" dirty="0" smtClean="0"/>
-              <a:t>You only find syntax errors when the interpreter executes a line of code</a:t>
-            </a:r>
+              <a:t>You only find syntax errors when the interpreter executes a line of </a:t>
+            </a:r>
+            <a:r>
+              <a:rPr lang="en-US" dirty="0" smtClean="0"/>
+              <a:t>code</a:t>
+            </a:r>
+          </a:p>
+          <a:p>
+            <a:pPr lvl="2"/>
+            <a:r>
+              <a:rPr lang="en-US" dirty="0" smtClean="0"/>
+              <a:t>There are tools that will alert you about a lot of typos.</a:t>
+            </a:r>
+            <a:endParaRPr lang="en-US" dirty="0" smtClean="0"/>
           </a:p>
           <a:p>
             <a:pPr lvl="1"/>
@@ -6335,9 +6359,17 @@
           <a:p>
             <a:r>
               <a:rPr lang="en-US" dirty="0" smtClean="0"/>
-              <a:t>Object Types</a:t>
-            </a:r>
-            <a:endParaRPr lang="en-US" dirty="0"/>
+              <a:t>Object </a:t>
+            </a:r>
+            <a:r>
+              <a:rPr lang="en-US" dirty="0" smtClean="0"/>
+              <a:t>Types </a:t>
+            </a:r>
+            <a:r>
+              <a:rPr lang="en-US" sz="3200" dirty="0" smtClean="0"/>
+              <a:t>(everything’s an object)</a:t>
+            </a:r>
+            <a:endParaRPr lang="en-US" sz="3200" dirty="0"/>
           </a:p>
         </p:txBody>
       </p:sp>
@@ -6354,7 +6386,7 @@
         <p:spPr/>
         <p:txBody>
           <a:bodyPr>
-            <a:normAutofit fontScale="92500" lnSpcReduction="10000"/>
+            <a:normAutofit fontScale="85000" lnSpcReduction="10000"/>
           </a:bodyPr>
           <a:lstStyle/>
           <a:p>
@@ -6375,7 +6407,14 @@
             </a:r>
             <a:r>
               <a:rPr lang="en-US" dirty="0" smtClean="0"/>
-              <a:t>=1, </a:t>
+              <a:t>=1</a:t>
+            </a:r>
+          </a:p>
+          <a:p>
+            <a:pPr lvl="1"/>
+            <a:r>
+              <a:rPr lang="en-US" dirty="0" smtClean="0"/>
+              <a:t>Float		</a:t>
             </a:r>
             <a:r>
               <a:rPr lang="en-US" dirty="0" err="1" smtClean="0"/>
@@ -6408,7 +6447,7 @@
             </a:r>
             <a:r>
               <a:rPr lang="en-US" dirty="0" smtClean="0"/>
-              <a:t>=“b”  or  </a:t>
+              <a:t>=“b” , </a:t>
             </a:r>
             <a:r>
               <a:rPr lang="en-US" dirty="0" err="1" smtClean="0"/>
@@ -6416,32 +6455,32 @@
             </a:r>
             <a:r>
               <a:rPr lang="en-US" dirty="0" smtClean="0"/>
-              <a:t>=‘Something longer’</a:t>
-            </a:r>
-          </a:p>
-          <a:p>
-            <a:r>
-              <a:rPr lang="en-US" dirty="0" smtClean="0"/>
-              <a:t>Lists:			A group of objects in a particular order</a:t>
-            </a:r>
-          </a:p>
-          <a:p>
-            <a:pPr lvl="1"/>
+              <a:t>=‘Something longer’, </a:t>
+            </a:r>
             <a:r>
               <a:rPr lang="en-US" dirty="0" err="1" smtClean="0"/>
               <a:t>obj</a:t>
             </a:r>
             <a:r>
               <a:rPr lang="en-US" dirty="0" smtClean="0"/>
-              <a:t>=[1,2,3], </a:t>
-            </a:r>
+              <a:t> = ‘something with ”something” else’</a:t>
+            </a:r>
+          </a:p>
+          <a:p>
+            <a:r>
+              <a:rPr lang="en-US" dirty="0" smtClean="0"/>
+              <a:t>Lists:			A group of objects in a particular order</a:t>
+            </a:r>
+          </a:p>
+          <a:p>
+            <a:pPr lvl="1"/>
             <a:r>
               <a:rPr lang="en-US" dirty="0" err="1" smtClean="0"/>
               <a:t>obj</a:t>
             </a:r>
             <a:r>
               <a:rPr lang="en-US" dirty="0" smtClean="0"/>
-              <a:t>=[1,2,’string’,3.0], </a:t>
+              <a:t>=[1,2,3], </a:t>
             </a:r>
             <a:r>
               <a:rPr lang="en-US" dirty="0" err="1" smtClean="0"/>
@@ -6449,6 +6488,14 @@
             </a:r>
             <a:r>
               <a:rPr lang="en-US" dirty="0" smtClean="0"/>
+              <a:t>=[1,2,’string’,3.0], </a:t>
+            </a:r>
+            <a:r>
+              <a:rPr lang="en-US" dirty="0" err="1" smtClean="0"/>
+              <a:t>obj</a:t>
+            </a:r>
+            <a:r>
+              <a:rPr lang="en-US" dirty="0" smtClean="0"/>
               <a:t>=[[1,2],[2,3,4],’</a:t>
             </a:r>
             <a:r>
@@ -6497,13 +6544,8 @@
           <a:p>
             <a:r>
               <a:rPr lang="en-US" dirty="0" smtClean="0"/>
-              <a:t>Generator	A list where the elements are created </a:t>
-            </a:r>
-            <a:r>
-              <a:rPr lang="en-US" smtClean="0"/>
-              <a:t>when requested</a:t>
-            </a:r>
-            <a:endParaRPr lang="en-US" dirty="0" smtClean="0"/>
+              <a:t>Generator	A list where the elements are created when requested</a:t>
+            </a:r>
           </a:p>
         </p:txBody>
       </p:sp>
@@ -6573,7 +6615,7 @@
         <p:spPr/>
         <p:txBody>
           <a:bodyPr>
-            <a:normAutofit fontScale="92500" lnSpcReduction="20000"/>
+            <a:normAutofit fontScale="85000" lnSpcReduction="20000"/>
           </a:bodyPr>
           <a:lstStyle/>
           <a:p>
@@ -6714,15 +6756,13 @@
             <a:pPr marL="0" indent="0">
               <a:buNone/>
             </a:pPr>
-            <a:endParaRPr lang="en-US" dirty="0" smtClean="0"/>
-          </a:p>
-          <a:p>
-            <a:pPr marL="0" indent="0">
-              <a:buNone/>
-            </a:pPr>
-            <a:r>
-              <a:rPr lang="en-US" dirty="0" smtClean="0"/>
-              <a:t>print(</a:t>
+            <a:r>
+              <a:rPr lang="en-US" dirty="0"/>
+              <a:t>d</a:t>
+            </a:r>
+            <a:r>
+              <a:rPr lang="en-US" dirty="0" smtClean="0"/>
+              <a:t>ump(</a:t>
             </a:r>
             <a:r>
               <a:rPr lang="en-US" dirty="0" err="1" smtClean="0"/>
@@ -6730,6 +6770,23 @@
             </a:r>
             <a:r>
               <a:rPr lang="en-US" dirty="0" smtClean="0"/>
+              <a:t>)</a:t>
+            </a:r>
+          </a:p>
+          <a:p>
+            <a:pPr marL="0" indent="0">
+              <a:buNone/>
+            </a:pPr>
+            <a:r>
+              <a:rPr lang="en-US" dirty="0" smtClean="0"/>
+              <a:t>print(</a:t>
+            </a:r>
+            <a:r>
+              <a:rPr lang="en-US" dirty="0" err="1" smtClean="0"/>
+              <a:t>obj</a:t>
+            </a:r>
+            <a:r>
+              <a:rPr lang="en-US" dirty="0" smtClean="0"/>
               <a:t>.__doc__)</a:t>
             </a:r>
           </a:p>
@@ -6744,6 +6801,27 @@
             <a:r>
               <a:rPr lang="en-US" dirty="0" smtClean="0"/>
               <a:t>ype(</a:t>
+            </a:r>
+            <a:r>
+              <a:rPr lang="en-US" dirty="0" err="1" smtClean="0"/>
+              <a:t>obj</a:t>
+            </a:r>
+            <a:r>
+              <a:rPr lang="en-US" dirty="0" smtClean="0"/>
+              <a:t>)</a:t>
+            </a:r>
+          </a:p>
+          <a:p>
+            <a:pPr marL="0" indent="0">
+              <a:buNone/>
+            </a:pPr>
+            <a:r>
+              <a:rPr lang="en-US" dirty="0"/>
+              <a:t>h</a:t>
+            </a:r>
+            <a:r>
+              <a:rPr lang="en-US" dirty="0" smtClean="0"/>
+              <a:t>elp(</a:t>
             </a:r>
             <a:r>
               <a:rPr lang="en-US" dirty="0" err="1" smtClean="0"/>
@@ -6924,7 +7002,9 @@
         </p:nvSpPr>
         <p:spPr/>
         <p:txBody>
-          <a:bodyPr/>
+          <a:bodyPr>
+            <a:normAutofit/>
+          </a:bodyPr>
           <a:lstStyle/>
           <a:p>
             <a:r>
@@ -6943,6 +7023,29 @@
               <a:rPr lang="en-US" dirty="0" smtClean="0"/>
               <a:t>While Statement</a:t>
             </a:r>
+          </a:p>
+          <a:p>
+            <a:r>
+              <a:rPr lang="en-US" dirty="0" smtClean="0"/>
+              <a:t>Class Definition</a:t>
+            </a:r>
+          </a:p>
+          <a:p>
+            <a:pPr lvl="1"/>
+            <a:r>
+              <a:rPr lang="en-US" dirty="0" smtClean="0"/>
+              <a:t>Instantiation</a:t>
+            </a:r>
+          </a:p>
+          <a:p>
+            <a:r>
+              <a:rPr lang="en-US" dirty="0" smtClean="0"/>
+              <a:t>Functions</a:t>
+            </a:r>
+          </a:p>
+          <a:p>
+            <a:pPr lvl="1"/>
+            <a:endParaRPr lang="en-US" dirty="0" smtClean="0"/>
           </a:p>
           <a:p>
             <a:endParaRPr lang="en-US" dirty="0"/>
@@ -7684,6 +7787,30 @@
             </a:r>
           </a:p>
           <a:p>
+            <a:pPr lvl="1"/>
+            <a:r>
+              <a:rPr lang="en-US" dirty="0" smtClean="0"/>
+              <a:t>Python 2.7 – </a:t>
+            </a:r>
+            <a:r>
+              <a:rPr lang="en-US" dirty="0" err="1" smtClean="0"/>
+              <a:t>iterable</a:t>
+            </a:r>
+            <a:endParaRPr lang="en-US" dirty="0" smtClean="0"/>
+          </a:p>
+          <a:p>
+            <a:pPr lvl="1"/>
+            <a:r>
+              <a:rPr lang="en-US" dirty="0" smtClean="0"/>
+              <a:t>Python 3.x - </a:t>
+            </a:r>
+            <a:r>
+              <a:rPr lang="en-US" dirty="0" err="1" smtClean="0"/>
+              <a:t>iteritem</a:t>
+            </a:r>
+            <a:endParaRPr lang="en-US" dirty="0" smtClean="0"/>
+          </a:p>
+          <a:p>
             <a:r>
               <a:rPr lang="en-US" dirty="0" smtClean="0"/>
               <a:t>Has unique syntax compared to other languages</a:t>
@@ -7860,7 +7987,7 @@
             <a:pPr lvl="2"/>
             <a:r>
               <a:rPr lang="en-US" dirty="0" smtClean="0"/>
-              <a:t>Does not create a list only a output each time it is called</a:t>
+              <a:t>Does not create a list only an output each time it is called</a:t>
             </a:r>
             <a:endParaRPr lang="en-US" dirty="0"/>
           </a:p>
@@ -7973,8 +8100,13 @@
           <a:p>
             <a:r>
               <a:rPr lang="en-US" dirty="0" smtClean="0"/>
-              <a:t>Object oriented language - but you don’t have to use objects</a:t>
-            </a:r>
+              <a:t>Object oriented language - but you don’t have to </a:t>
+            </a:r>
+            <a:r>
+              <a:rPr lang="en-US" dirty="0" smtClean="0"/>
+              <a:t>create objects</a:t>
+            </a:r>
+            <a:endParaRPr lang="en-US" dirty="0" smtClean="0"/>
           </a:p>
           <a:p>
             <a:r>
@@ -7989,8 +8121,13 @@
           <a:p>
             <a:r>
               <a:rPr lang="en-US" dirty="0" smtClean="0"/>
-              <a:t>Considered a scripting language because it has an interactive shell</a:t>
-            </a:r>
+              <a:t>Considered a scripting language because it has an interactive </a:t>
+            </a:r>
+            <a:r>
+              <a:rPr lang="en-US" dirty="0" smtClean="0"/>
+              <a:t>shell</a:t>
+            </a:r>
+            <a:endParaRPr lang="en-US" dirty="0" smtClean="0"/>
           </a:p>
           <a:p>
             <a:endParaRPr lang="en-US" dirty="0" smtClean="0"/>
@@ -8239,6 +8376,444 @@
 </p:sld>
 </file>
 
+<file path=ppt/slides/slide21.xml><?xml version="1.0" encoding="utf-8"?>
+<p:sld xmlns:a="http://schemas.openxmlformats.org/drawingml/2006/main" xmlns:r="http://schemas.openxmlformats.org/officeDocument/2006/relationships" xmlns:p="http://schemas.openxmlformats.org/presentationml/2006/main">
+  <p:cSld>
+    <p:spTree>
+      <p:nvGrpSpPr>
+        <p:cNvPr id="1" name=""/>
+        <p:cNvGrpSpPr/>
+        <p:nvPr/>
+      </p:nvGrpSpPr>
+      <p:grpSpPr>
+        <a:xfrm>
+          <a:off x="0" y="0"/>
+          <a:ext cx="0" cy="0"/>
+          <a:chOff x="0" y="0"/>
+          <a:chExt cx="0" cy="0"/>
+        </a:xfrm>
+      </p:grpSpPr>
+      <p:sp>
+        <p:nvSpPr>
+          <p:cNvPr id="2" name="Title 1"/>
+          <p:cNvSpPr>
+            <a:spLocks noGrp="1"/>
+          </p:cNvSpPr>
+          <p:nvPr>
+            <p:ph type="title"/>
+          </p:nvPr>
+        </p:nvSpPr>
+        <p:spPr/>
+        <p:txBody>
+          <a:bodyPr/>
+          <a:lstStyle/>
+          <a:p>
+            <a:r>
+              <a:rPr lang="en-US" dirty="0" smtClean="0"/>
+              <a:t>Classes, Objects, Functions</a:t>
+            </a:r>
+            <a:endParaRPr lang="en-US" dirty="0"/>
+          </a:p>
+        </p:txBody>
+      </p:sp>
+      <p:sp>
+        <p:nvSpPr>
+          <p:cNvPr id="3" name="Content Placeholder 2"/>
+          <p:cNvSpPr>
+            <a:spLocks noGrp="1"/>
+          </p:cNvSpPr>
+          <p:nvPr>
+            <p:ph idx="1"/>
+          </p:nvPr>
+        </p:nvSpPr>
+        <p:spPr/>
+        <p:txBody>
+          <a:bodyPr>
+            <a:normAutofit fontScale="77500" lnSpcReduction="20000"/>
+          </a:bodyPr>
+          <a:lstStyle/>
+          <a:p>
+            <a:r>
+              <a:rPr lang="en-US" dirty="0" smtClean="0"/>
+              <a:t>Class (A description of something that can be created)</a:t>
+            </a:r>
+            <a:endParaRPr lang="en-US" dirty="0"/>
+          </a:p>
+          <a:p>
+            <a:pPr lvl="1"/>
+            <a:r>
+              <a:rPr lang="en-US" dirty="0" smtClean="0"/>
+              <a:t>NOTHING IS PRIVATE!</a:t>
+            </a:r>
+          </a:p>
+          <a:p>
+            <a:pPr lvl="1"/>
+            <a:r>
+              <a:rPr lang="en-US" dirty="0" smtClean="0"/>
+              <a:t>Attributes </a:t>
+            </a:r>
+            <a:r>
+              <a:rPr lang="en-US" dirty="0" err="1"/>
+              <a:t>a.k.a</a:t>
+            </a:r>
+            <a:r>
+              <a:rPr lang="en-US" dirty="0"/>
+              <a:t> </a:t>
+            </a:r>
+            <a:r>
+              <a:rPr lang="en-US" dirty="0" smtClean="0"/>
+              <a:t>Fields</a:t>
+            </a:r>
+          </a:p>
+          <a:p>
+            <a:pPr lvl="2"/>
+            <a:r>
+              <a:rPr lang="en-US" dirty="0" smtClean="0"/>
+              <a:t>Can be defined explicitly</a:t>
+            </a:r>
+          </a:p>
+          <a:p>
+            <a:pPr lvl="2"/>
+            <a:r>
+              <a:rPr lang="en-US" dirty="0" smtClean="0"/>
+              <a:t>Can be defined in the construction (__</a:t>
+            </a:r>
+            <a:r>
+              <a:rPr lang="en-US" dirty="0" err="1" smtClean="0"/>
+              <a:t>init</a:t>
+            </a:r>
+            <a:r>
+              <a:rPr lang="en-US" dirty="0" smtClean="0"/>
+              <a:t>__) method</a:t>
+            </a:r>
+          </a:p>
+          <a:p>
+            <a:pPr lvl="3"/>
+            <a:r>
+              <a:rPr lang="en-US" dirty="0" smtClean="0"/>
+              <a:t>If defined in constructor the a child class MUST call it’s parent (super) </a:t>
+            </a:r>
+            <a:r>
+              <a:rPr lang="en-US" smtClean="0"/>
+              <a:t>class constructor</a:t>
+            </a:r>
+            <a:endParaRPr lang="en-US" dirty="0"/>
+          </a:p>
+          <a:p>
+            <a:pPr lvl="1"/>
+            <a:r>
+              <a:rPr lang="en-US" dirty="0"/>
+              <a:t>Constructor (__</a:t>
+            </a:r>
+            <a:r>
+              <a:rPr lang="en-US" dirty="0" err="1"/>
+              <a:t>init</a:t>
+            </a:r>
+            <a:r>
+              <a:rPr lang="en-US" dirty="0"/>
+              <a:t>__)/Destructor (__del__)</a:t>
+            </a:r>
+          </a:p>
+          <a:p>
+            <a:pPr lvl="1"/>
+            <a:r>
+              <a:rPr lang="en-US" dirty="0" smtClean="0"/>
+              <a:t>Methods</a:t>
+            </a:r>
+            <a:endParaRPr lang="en-US" dirty="0"/>
+          </a:p>
+          <a:p>
+            <a:r>
+              <a:rPr lang="en-US" dirty="0" smtClean="0"/>
+              <a:t>Objects (Instantiation of a Class)</a:t>
+            </a:r>
+            <a:endParaRPr lang="en-US" dirty="0"/>
+          </a:p>
+          <a:p>
+            <a:r>
+              <a:rPr lang="en-US" dirty="0"/>
+              <a:t>Functions</a:t>
+            </a:r>
+          </a:p>
+          <a:p>
+            <a:pPr lvl="1"/>
+            <a:r>
+              <a:rPr lang="en-US" dirty="0"/>
+              <a:t>Scope</a:t>
+            </a:r>
+          </a:p>
+          <a:p>
+            <a:pPr lvl="1"/>
+            <a:r>
+              <a:rPr lang="en-US" dirty="0" smtClean="0"/>
+              <a:t>Parameters</a:t>
+            </a:r>
+          </a:p>
+          <a:p>
+            <a:pPr lvl="2"/>
+            <a:r>
+              <a:rPr lang="en-US" dirty="0" smtClean="0"/>
+              <a:t>*</a:t>
+            </a:r>
+            <a:r>
+              <a:rPr lang="en-US" dirty="0" err="1" smtClean="0"/>
+              <a:t>args</a:t>
+            </a:r>
+            <a:r>
+              <a:rPr lang="en-US" dirty="0" smtClean="0"/>
+              <a:t>: unlabeled arguments</a:t>
+            </a:r>
+          </a:p>
+          <a:p>
+            <a:pPr lvl="2"/>
+            <a:r>
+              <a:rPr lang="en-US" dirty="0" smtClean="0"/>
+              <a:t>**</a:t>
+            </a:r>
+            <a:r>
+              <a:rPr lang="en-US" dirty="0" err="1" smtClean="0"/>
+              <a:t>kwargs</a:t>
+            </a:r>
+            <a:r>
+              <a:rPr lang="en-US" dirty="0" smtClean="0"/>
+              <a:t>: labeled arguments</a:t>
+            </a:r>
+            <a:endParaRPr lang="en-US" dirty="0"/>
+          </a:p>
+          <a:p>
+            <a:endParaRPr lang="en-US" dirty="0"/>
+          </a:p>
+        </p:txBody>
+      </p:sp>
+    </p:spTree>
+    <p:extLst>
+      <p:ext uri="{BB962C8B-B14F-4D97-AF65-F5344CB8AC3E}">
+        <p14:creationId xmlns:p14="http://schemas.microsoft.com/office/powerpoint/2010/main" val="479699744"/>
+      </p:ext>
+    </p:extLst>
+  </p:cSld>
+  <p:clrMapOvr>
+    <a:masterClrMapping/>
+  </p:clrMapOvr>
+</p:sld>
+</file>
+
+<file path=ppt/slides/slide22.xml><?xml version="1.0" encoding="utf-8"?>
+<p:sld xmlns:a="http://schemas.openxmlformats.org/drawingml/2006/main" xmlns:r="http://schemas.openxmlformats.org/officeDocument/2006/relationships" xmlns:p="http://schemas.openxmlformats.org/presentationml/2006/main">
+  <p:cSld>
+    <p:spTree>
+      <p:nvGrpSpPr>
+        <p:cNvPr id="1" name=""/>
+        <p:cNvGrpSpPr/>
+        <p:nvPr/>
+      </p:nvGrpSpPr>
+      <p:grpSpPr>
+        <a:xfrm>
+          <a:off x="0" y="0"/>
+          <a:ext cx="0" cy="0"/>
+          <a:chOff x="0" y="0"/>
+          <a:chExt cx="0" cy="0"/>
+        </a:xfrm>
+      </p:grpSpPr>
+      <p:sp>
+        <p:nvSpPr>
+          <p:cNvPr id="2" name="Title 1"/>
+          <p:cNvSpPr>
+            <a:spLocks noGrp="1"/>
+          </p:cNvSpPr>
+          <p:nvPr>
+            <p:ph type="title"/>
+          </p:nvPr>
+        </p:nvSpPr>
+        <p:spPr/>
+        <p:txBody>
+          <a:bodyPr/>
+          <a:lstStyle/>
+          <a:p>
+            <a:r>
+              <a:rPr lang="en-US" dirty="0" smtClean="0"/>
+              <a:t>Function Definition</a:t>
+            </a:r>
+            <a:endParaRPr lang="en-US" dirty="0"/>
+          </a:p>
+        </p:txBody>
+      </p:sp>
+      <p:sp>
+        <p:nvSpPr>
+          <p:cNvPr id="3" name="Content Placeholder 2"/>
+          <p:cNvSpPr>
+            <a:spLocks noGrp="1"/>
+          </p:cNvSpPr>
+          <p:nvPr>
+            <p:ph idx="1"/>
+          </p:nvPr>
+        </p:nvSpPr>
+        <p:spPr/>
+        <p:txBody>
+          <a:bodyPr/>
+          <a:lstStyle/>
+          <a:p>
+            <a:r>
+              <a:rPr lang="en-US" dirty="0" smtClean="0"/>
+              <a:t>A method NOT associated with a class</a:t>
+            </a:r>
+          </a:p>
+          <a:p>
+            <a:r>
+              <a:rPr lang="en-US" dirty="0" smtClean="0"/>
+              <a:t>Uses the same syntax</a:t>
+            </a:r>
+            <a:endParaRPr lang="en-US" dirty="0"/>
+          </a:p>
+        </p:txBody>
+      </p:sp>
+    </p:spTree>
+    <p:extLst>
+      <p:ext uri="{BB962C8B-B14F-4D97-AF65-F5344CB8AC3E}">
+        <p14:creationId xmlns:p14="http://schemas.microsoft.com/office/powerpoint/2010/main" val="2160672038"/>
+      </p:ext>
+    </p:extLst>
+  </p:cSld>
+  <p:clrMapOvr>
+    <a:masterClrMapping/>
+  </p:clrMapOvr>
+</p:sld>
+</file>
+
+<file path=ppt/slides/slide23.xml><?xml version="1.0" encoding="utf-8"?>
+<p:sld xmlns:a="http://schemas.openxmlformats.org/drawingml/2006/main" xmlns:r="http://schemas.openxmlformats.org/officeDocument/2006/relationships" xmlns:p="http://schemas.openxmlformats.org/presentationml/2006/main">
+  <p:cSld>
+    <p:spTree>
+      <p:nvGrpSpPr>
+        <p:cNvPr id="1" name=""/>
+        <p:cNvGrpSpPr/>
+        <p:nvPr/>
+      </p:nvGrpSpPr>
+      <p:grpSpPr>
+        <a:xfrm>
+          <a:off x="0" y="0"/>
+          <a:ext cx="0" cy="0"/>
+          <a:chOff x="0" y="0"/>
+          <a:chExt cx="0" cy="0"/>
+        </a:xfrm>
+      </p:grpSpPr>
+      <p:sp>
+        <p:nvSpPr>
+          <p:cNvPr id="2" name="Title 1"/>
+          <p:cNvSpPr>
+            <a:spLocks noGrp="1"/>
+          </p:cNvSpPr>
+          <p:nvPr>
+            <p:ph type="title"/>
+          </p:nvPr>
+        </p:nvSpPr>
+        <p:spPr/>
+        <p:txBody>
+          <a:bodyPr/>
+          <a:lstStyle/>
+          <a:p>
+            <a:r>
+              <a:rPr lang="en-US" dirty="0" smtClean="0"/>
+              <a:t>Conclusion </a:t>
+            </a:r>
+            <a:br>
+              <a:rPr lang="en-US" dirty="0" smtClean="0"/>
+            </a:br>
+            <a:r>
+              <a:rPr lang="en-US" sz="3200" dirty="0" smtClean="0"/>
+              <a:t>(you never thought I would shut up did you?)</a:t>
+            </a:r>
+            <a:endParaRPr lang="en-US" sz="3200" dirty="0"/>
+          </a:p>
+        </p:txBody>
+      </p:sp>
+      <p:sp>
+        <p:nvSpPr>
+          <p:cNvPr id="3" name="Content Placeholder 2"/>
+          <p:cNvSpPr>
+            <a:spLocks noGrp="1"/>
+          </p:cNvSpPr>
+          <p:nvPr>
+            <p:ph idx="1"/>
+          </p:nvPr>
+        </p:nvSpPr>
+        <p:spPr/>
+        <p:txBody>
+          <a:bodyPr/>
+          <a:lstStyle/>
+          <a:p>
+            <a:r>
+              <a:rPr lang="en-US" dirty="0" smtClean="0"/>
+              <a:t>Python is ridiculously flexible, but that requires your diligence.</a:t>
+            </a:r>
+          </a:p>
+          <a:p>
+            <a:pPr marL="0" indent="0">
+              <a:buNone/>
+            </a:pPr>
+            <a:endParaRPr lang="en-US" dirty="0" smtClean="0"/>
+          </a:p>
+          <a:p>
+            <a:r>
+              <a:rPr lang="en-US" dirty="0" smtClean="0"/>
+              <a:t>Recommended on-line resources</a:t>
+            </a:r>
+          </a:p>
+          <a:p>
+            <a:pPr lvl="1"/>
+            <a:r>
+              <a:rPr lang="en-US" dirty="0" smtClean="0">
+                <a:hlinkClick r:id="rId2"/>
+              </a:rPr>
+              <a:t>www.python.org</a:t>
+            </a:r>
+            <a:endParaRPr lang="en-US" dirty="0" smtClean="0"/>
+          </a:p>
+          <a:p>
+            <a:pPr lvl="1"/>
+            <a:r>
+              <a:rPr lang="en-US" dirty="0" smtClean="0">
+                <a:hlinkClick r:id="rId3"/>
+              </a:rPr>
+              <a:t>www.stackoverflow.com</a:t>
+            </a:r>
+            <a:endParaRPr lang="en-US" dirty="0" smtClean="0"/>
+          </a:p>
+          <a:p>
+            <a:pPr lvl="1"/>
+            <a:r>
+              <a:rPr lang="en-US" dirty="0" smtClean="0"/>
+              <a:t>Udemy.com (On-line training site)</a:t>
+            </a:r>
+          </a:p>
+          <a:p>
+            <a:pPr lvl="2"/>
+            <a:r>
+              <a:rPr lang="en-US" b="1" dirty="0"/>
+              <a:t>Complete Python Bootcamp: Go from zero to hero in Python</a:t>
+            </a:r>
+          </a:p>
+          <a:p>
+            <a:pPr marL="914400" lvl="2" indent="0">
+              <a:buNone/>
+            </a:pPr>
+            <a:endParaRPr lang="en-US" dirty="0"/>
+          </a:p>
+        </p:txBody>
+      </p:sp>
+    </p:spTree>
+    <p:extLst>
+      <p:ext uri="{BB962C8B-B14F-4D97-AF65-F5344CB8AC3E}">
+        <p14:creationId xmlns:p14="http://schemas.microsoft.com/office/powerpoint/2010/main" val="3048751577"/>
+      </p:ext>
+    </p:extLst>
+  </p:cSld>
+  <p:clrMapOvr>
+    <a:masterClrMapping/>
+  </p:clrMapOvr>
+</p:sld>
+</file>
+
 <file path=ppt/slides/slide3.xml><?xml version="1.0" encoding="utf-8"?>
 <p:sld xmlns:a="http://schemas.openxmlformats.org/drawingml/2006/main" xmlns:r="http://schemas.openxmlformats.org/officeDocument/2006/relationships" xmlns:p="http://schemas.openxmlformats.org/presentationml/2006/main">
   <p:cSld>
@@ -8427,14 +9002,31 @@
             </a:r>
             <a:r>
               <a:rPr lang="en-US" dirty="0" smtClean="0"/>
-              <a:t>) when timing is critical</a:t>
-            </a:r>
-          </a:p>
-          <a:p>
-            <a:r>
-              <a:rPr lang="en-US" dirty="0" smtClean="0"/>
-              <a:t>Processor is extremely slow</a:t>
-            </a:r>
+              <a:t>) when timing is </a:t>
+            </a:r>
+            <a:r>
+              <a:rPr lang="en-US" dirty="0" smtClean="0"/>
+              <a:t>critical</a:t>
+            </a:r>
+          </a:p>
+          <a:p>
+            <a:pPr lvl="1"/>
+            <a:r>
+              <a:rPr lang="en-US" dirty="0" smtClean="0"/>
+              <a:t>‘C’ is used for near real-time interactions with physical devices.</a:t>
+            </a:r>
+            <a:endParaRPr lang="en-US" dirty="0" smtClean="0"/>
+          </a:p>
+          <a:p>
+            <a:r>
+              <a:rPr lang="en-US" dirty="0" smtClean="0"/>
+              <a:t>Processor is extremely </a:t>
+            </a:r>
+            <a:r>
+              <a:rPr lang="en-US" dirty="0" smtClean="0"/>
+              <a:t>slow</a:t>
+            </a:r>
+            <a:endParaRPr lang="en-US" dirty="0" smtClean="0"/>
           </a:p>
           <a:p>
             <a:r>
@@ -8576,8 +9168,13 @@
             </a:r>
             <a:r>
               <a:rPr lang="en-US" dirty="0" smtClean="0"/>
-              <a:t>“types”</a:t>
-            </a:r>
+              <a:t>“</a:t>
+            </a:r>
+            <a:r>
+              <a:rPr lang="en-US" dirty="0" smtClean="0"/>
+              <a:t>types/classes”</a:t>
+            </a:r>
+            <a:endParaRPr lang="en-US" dirty="0" smtClean="0"/>
           </a:p>
           <a:p>
             <a:r>
@@ -9031,7 +9628,7 @@
         <p:spPr/>
         <p:txBody>
           <a:bodyPr>
-            <a:normAutofit fontScale="77500" lnSpcReduction="20000"/>
+            <a:normAutofit fontScale="70000" lnSpcReduction="20000"/>
           </a:bodyPr>
           <a:lstStyle/>
           <a:p>
@@ -9044,7 +9641,11 @@
             <a:pPr lvl="1"/>
             <a:r>
               <a:rPr lang="en-US" dirty="0" smtClean="0"/>
-              <a:t>Select the appropriate version:</a:t>
+              <a:t>Using IDLE -Select </a:t>
+            </a:r>
+            <a:r>
+              <a:rPr lang="en-US" dirty="0" smtClean="0"/>
+              <a:t>the appropriate version:</a:t>
             </a:r>
           </a:p>
           <a:p>
@@ -9072,8 +9673,24 @@
           <a:p>
             <a:pPr lvl="2"/>
             <a:r>
-              <a:rPr lang="en-US" dirty="0"/>
-              <a:t>https://www.python.org/downloads/release/python-354/</a:t>
+              <a:rPr lang="en-US" dirty="0">
+                <a:hlinkClick r:id="rId3"/>
+              </a:rPr>
+              <a:t>https://www.python.org/downloads/release/python-354</a:t>
+            </a:r>
+            <a:r>
+              <a:rPr lang="en-US" dirty="0" smtClean="0">
+                <a:hlinkClick r:id="rId3"/>
+              </a:rPr>
+              <a:t>/</a:t>
+            </a:r>
+            <a:endParaRPr lang="en-US" dirty="0" smtClean="0"/>
+          </a:p>
+          <a:p>
+            <a:pPr lvl="1"/>
+            <a:r>
+              <a:rPr lang="en-US" smtClean="0"/>
+              <a:t>You can install in Ubuntu for Windows IF you have the Windows 10 Creator Update</a:t>
             </a:r>
             <a:endParaRPr lang="en-US" dirty="0" smtClean="0"/>
           </a:p>
@@ -9282,8 +9899,9 @@
           <a:p>
             <a:r>
               <a:rPr lang="en-US" dirty="0" smtClean="0"/>
-              <a:t>Interactive</a:t>
-            </a:r>
+              <a:t>Interactive – type ‘python’ on the command line</a:t>
+            </a:r>
+            <a:endParaRPr lang="en-US" dirty="0" smtClean="0"/>
           </a:p>
           <a:p>
             <a:pPr lvl="1"/>
@@ -9316,7 +9934,15 @@
             <a:pPr lvl="2"/>
             <a:r>
               <a:rPr lang="en-US" dirty="0" smtClean="0"/>
-              <a:t>Python script.py</a:t>
+              <a:t>p</a:t>
+            </a:r>
+            <a:r>
+              <a:rPr lang="en-US" dirty="0" smtClean="0"/>
+              <a:t>ython </a:t>
+            </a:r>
+            <a:r>
+              <a:rPr lang="en-US" dirty="0" smtClean="0"/>
+              <a:t>script.py</a:t>
             </a:r>
           </a:p>
           <a:p>
@@ -9334,7 +9960,7 @@
             <a:pPr lvl="3"/>
             <a:r>
               <a:rPr lang="en-US" dirty="0" smtClean="0"/>
-              <a:t>First line of file must be: #!/bin/python</a:t>
+              <a:t>Typical Unix/Linux first line of file must be: #!/bin/python</a:t>
             </a:r>
           </a:p>
           <a:p>
@@ -9363,23 +9989,13 @@
             </a:pPr>
             <a:r>
               <a:rPr lang="en-US" dirty="0" smtClean="0"/>
-              <a:t>curl –</a:t>
-            </a:r>
-            <a:r>
-              <a:rPr lang="en-US" smtClean="0"/>
-              <a:t>X GET </a:t>
-            </a:r>
-            <a:r>
-              <a:rPr lang="en-US" smtClean="0">
-                <a:hlinkClick r:id="rId2"/>
-              </a:rPr>
-              <a:t>http</a:t>
+              <a:t>curl –X GET </a:t>
             </a:r>
             <a:r>
               <a:rPr lang="en-US" dirty="0" smtClean="0">
                 <a:hlinkClick r:id="rId2"/>
               </a:rPr>
-              <a:t>://ipaddr/api/powerpack</a:t>
+              <a:t>http://ipaddr/api/powerpack</a:t>
             </a:r>
             <a:r>
               <a:rPr lang="en-US" dirty="0" smtClean="0"/>

</xml_diff>

<commit_message>
Correction to definition of a String type
</commit_message>
<xml_diff>
--- a/Python Introduction.pptx
+++ b/Python Introduction.pptx
@@ -320,7 +320,7 @@
           <a:p>
             <a:fld id="{4AAD347D-5ACD-4C99-B74B-A9C85AD731AF}" type="datetimeFigureOut">
               <a:rPr lang="en-US" dirty="0"/>
-              <a:t>9/27/2017</a:t>
+              <a:t>10/8/2017</a:t>
             </a:fld>
             <a:endParaRPr lang="en-US" dirty="0"/>
           </a:p>
@@ -590,7 +590,7 @@
           <a:p>
             <a:fld id="{4509A250-FF31-4206-8172-F9D3106AACB1}" type="datetimeFigureOut">
               <a:rPr lang="en-US" dirty="0"/>
-              <a:t>9/27/2017</a:t>
+              <a:t>10/8/2017</a:t>
             </a:fld>
             <a:endParaRPr lang="en-US" dirty="0"/>
           </a:p>
@@ -779,7 +779,7 @@
           <a:p>
             <a:fld id="{4509A250-FF31-4206-8172-F9D3106AACB1}" type="datetimeFigureOut">
               <a:rPr lang="en-US" dirty="0"/>
-              <a:t>9/27/2017</a:t>
+              <a:t>10/8/2017</a:t>
             </a:fld>
             <a:endParaRPr lang="en-US" dirty="0"/>
           </a:p>
@@ -1045,7 +1045,7 @@
           <a:p>
             <a:fld id="{4509A250-FF31-4206-8172-F9D3106AACB1}" type="datetimeFigureOut">
               <a:rPr lang="en-US" dirty="0"/>
-              <a:t>9/27/2017</a:t>
+              <a:t>10/8/2017</a:t>
             </a:fld>
             <a:endParaRPr lang="en-US" dirty="0"/>
           </a:p>
@@ -1367,7 +1367,7 @@
           <a:p>
             <a:fld id="{4509A250-FF31-4206-8172-F9D3106AACB1}" type="datetimeFigureOut">
               <a:rPr lang="en-US" dirty="0"/>
-              <a:t>9/27/2017</a:t>
+              <a:t>10/8/2017</a:t>
             </a:fld>
             <a:endParaRPr lang="en-US" dirty="0"/>
           </a:p>
@@ -1981,7 +1981,7 @@
           <a:p>
             <a:fld id="{4509A250-FF31-4206-8172-F9D3106AACB1}" type="datetimeFigureOut">
               <a:rPr lang="en-US" dirty="0"/>
-              <a:t>9/27/2017</a:t>
+              <a:t>10/8/2017</a:t>
             </a:fld>
             <a:endParaRPr lang="en-US" dirty="0"/>
           </a:p>
@@ -2823,7 +2823,7 @@
           <a:p>
             <a:fld id="{4509A250-FF31-4206-8172-F9D3106AACB1}" type="datetimeFigureOut">
               <a:rPr lang="en-US" dirty="0"/>
-              <a:t>9/27/2017</a:t>
+              <a:t>10/8/2017</a:t>
             </a:fld>
             <a:endParaRPr lang="en-US" dirty="0"/>
           </a:p>
@@ -2988,7 +2988,7 @@
           <a:p>
             <a:fld id="{4509A250-FF31-4206-8172-F9D3106AACB1}" type="datetimeFigureOut">
               <a:rPr lang="en-US" dirty="0"/>
-              <a:t>9/27/2017</a:t>
+              <a:t>10/8/2017</a:t>
             </a:fld>
             <a:endParaRPr lang="en-US" dirty="0"/>
           </a:p>
@@ -3163,7 +3163,7 @@
           <a:p>
             <a:fld id="{4509A250-FF31-4206-8172-F9D3106AACB1}" type="datetimeFigureOut">
               <a:rPr lang="en-US" dirty="0"/>
-              <a:t>9/27/2017</a:t>
+              <a:t>10/8/2017</a:t>
             </a:fld>
             <a:endParaRPr lang="en-US" dirty="0"/>
           </a:p>
@@ -3328,7 +3328,7 @@
           <a:p>
             <a:fld id="{9796027F-7875-4030-9381-8BD8C4F21935}" type="datetimeFigureOut">
               <a:rPr lang="en-US" dirty="0"/>
-              <a:t>9/27/2017</a:t>
+              <a:t>10/8/2017</a:t>
             </a:fld>
             <a:endParaRPr lang="en-US" dirty="0"/>
           </a:p>
@@ -3570,7 +3570,7 @@
           <a:p>
             <a:fld id="{9796027F-7875-4030-9381-8BD8C4F21935}" type="datetimeFigureOut">
               <a:rPr lang="en-US" dirty="0"/>
-              <a:t>9/27/2017</a:t>
+              <a:t>10/8/2017</a:t>
             </a:fld>
             <a:endParaRPr lang="en-US" dirty="0"/>
           </a:p>
@@ -3857,7 +3857,7 @@
           <a:p>
             <a:fld id="{9796027F-7875-4030-9381-8BD8C4F21935}" type="datetimeFigureOut">
               <a:rPr lang="en-US" dirty="0"/>
-              <a:t>9/27/2017</a:t>
+              <a:t>10/8/2017</a:t>
             </a:fld>
             <a:endParaRPr lang="en-US" dirty="0"/>
           </a:p>
@@ -4296,7 +4296,7 @@
           <a:p>
             <a:fld id="{9796027F-7875-4030-9381-8BD8C4F21935}" type="datetimeFigureOut">
               <a:rPr lang="en-US" dirty="0"/>
-              <a:t>9/27/2017</a:t>
+              <a:t>10/8/2017</a:t>
             </a:fld>
             <a:endParaRPr lang="en-US" dirty="0"/>
           </a:p>
@@ -4409,7 +4409,7 @@
           <a:p>
             <a:fld id="{4509A250-FF31-4206-8172-F9D3106AACB1}" type="datetimeFigureOut">
               <a:rPr lang="en-US" dirty="0"/>
-              <a:t>9/27/2017</a:t>
+              <a:t>10/8/2017</a:t>
             </a:fld>
             <a:endParaRPr lang="en-US" dirty="0"/>
           </a:p>
@@ -4499,7 +4499,7 @@
           <a:p>
             <a:fld id="{4509A250-FF31-4206-8172-F9D3106AACB1}" type="datetimeFigureOut">
               <a:rPr lang="en-US" dirty="0"/>
-              <a:t>9/27/2017</a:t>
+              <a:t>10/8/2017</a:t>
             </a:fld>
             <a:endParaRPr lang="en-US" dirty="0"/>
           </a:p>
@@ -4773,7 +4773,7 @@
           <a:p>
             <a:fld id="{4509A250-FF31-4206-8172-F9D3106AACB1}" type="datetimeFigureOut">
               <a:rPr lang="en-US" dirty="0"/>
-              <a:t>9/27/2017</a:t>
+              <a:t>10/8/2017</a:t>
             </a:fld>
             <a:endParaRPr lang="en-US" dirty="0"/>
           </a:p>
@@ -5043,7 +5043,7 @@
           <a:p>
             <a:fld id="{4509A250-FF31-4206-8172-F9D3106AACB1}" type="datetimeFigureOut">
               <a:rPr lang="en-US" dirty="0"/>
-              <a:t>9/27/2017</a:t>
+              <a:t>10/8/2017</a:t>
             </a:fld>
             <a:endParaRPr lang="en-US" dirty="0"/>
           </a:p>
@@ -5461,7 +5461,7 @@
           <a:p>
             <a:fld id="{4AAD347D-5ACD-4C99-B74B-A9C85AD731AF}" type="datetimeFigureOut">
               <a:rPr lang="en-US" dirty="0"/>
-              <a:t>9/27/2017</a:t>
+              <a:t>10/8/2017</a:t>
             </a:fld>
             <a:endParaRPr lang="en-US" dirty="0"/>
           </a:p>
@@ -6291,11 +6291,7 @@
             <a:pPr lvl="1"/>
             <a:r>
               <a:rPr lang="en-US" dirty="0" smtClean="0"/>
-              <a:t>You only find syntax errors when the interpreter executes a line of </a:t>
-            </a:r>
-            <a:r>
-              <a:rPr lang="en-US" dirty="0" smtClean="0"/>
-              <a:t>code</a:t>
+              <a:t>You only find syntax errors when the interpreter executes a line of code</a:t>
             </a:r>
           </a:p>
           <a:p>
@@ -6304,7 +6300,6 @@
               <a:rPr lang="en-US" dirty="0" smtClean="0"/>
               <a:t>There are tools that will alert you about a lot of typos.</a:t>
             </a:r>
-            <a:endParaRPr lang="en-US" dirty="0" smtClean="0"/>
           </a:p>
           <a:p>
             <a:pPr lvl="1"/>
@@ -6359,11 +6354,7 @@
           <a:p>
             <a:r>
               <a:rPr lang="en-US" dirty="0" smtClean="0"/>
-              <a:t>Object </a:t>
-            </a:r>
-            <a:r>
-              <a:rPr lang="en-US" dirty="0" smtClean="0"/>
-              <a:t>Types </a:t>
+              <a:t>Object Types </a:t>
             </a:r>
             <a:r>
               <a:rPr lang="en-US" sz="3200" dirty="0" smtClean="0"/>
@@ -6428,7 +6419,15 @@
           <a:p>
             <a:r>
               <a:rPr lang="en-US" dirty="0" smtClean="0"/>
-              <a:t>Strings: 		any number of characters enclosed in quotes (‘ or “)</a:t>
+              <a:t>Strings: 		</a:t>
+            </a:r>
+            <a:r>
+              <a:rPr lang="en-US" dirty="0" smtClean="0"/>
+              <a:t>An immutable list of </a:t>
+            </a:r>
+            <a:r>
+              <a:rPr lang="en-US" dirty="0" smtClean="0"/>
+              <a:t>characters enclosed in quotes (‘ or “)</a:t>
             </a:r>
           </a:p>
           <a:p>
@@ -6663,6 +6662,40 @@
               <a:buNone/>
             </a:pPr>
             <a:r>
+              <a:rPr lang="en-US" dirty="0"/>
+              <a:t>type(</a:t>
+            </a:r>
+            <a:r>
+              <a:rPr lang="en-US" dirty="0" err="1"/>
+              <a:t>obj</a:t>
+            </a:r>
+            <a:r>
+              <a:rPr lang="en-US" dirty="0"/>
+              <a:t>)</a:t>
+            </a:r>
+          </a:p>
+          <a:p>
+            <a:pPr marL="0" indent="0">
+              <a:buNone/>
+            </a:pPr>
+            <a:r>
+              <a:rPr lang="en-US" dirty="0"/>
+              <a:t>help(</a:t>
+            </a:r>
+            <a:r>
+              <a:rPr lang="en-US" dirty="0" err="1"/>
+              <a:t>obj</a:t>
+            </a:r>
+            <a:r>
+              <a:rPr lang="en-US" dirty="0" smtClean="0"/>
+              <a:t>)</a:t>
+            </a:r>
+          </a:p>
+          <a:p>
+            <a:pPr marL="0" indent="0">
+              <a:buNone/>
+            </a:pPr>
+            <a:r>
               <a:rPr lang="en-US" dirty="0" err="1" smtClean="0"/>
               <a:t>def</a:t>
             </a:r>
@@ -6788,48 +6821,6 @@
             <a:r>
               <a:rPr lang="en-US" dirty="0" smtClean="0"/>
               <a:t>.__doc__)</a:t>
-            </a:r>
-          </a:p>
-          <a:p>
-            <a:pPr marL="0" indent="0">
-              <a:buNone/>
-            </a:pPr>
-            <a:r>
-              <a:rPr lang="en-US" dirty="0"/>
-              <a:t>t</a:t>
-            </a:r>
-            <a:r>
-              <a:rPr lang="en-US" dirty="0" smtClean="0"/>
-              <a:t>ype(</a:t>
-            </a:r>
-            <a:r>
-              <a:rPr lang="en-US" dirty="0" err="1" smtClean="0"/>
-              <a:t>obj</a:t>
-            </a:r>
-            <a:r>
-              <a:rPr lang="en-US" dirty="0" smtClean="0"/>
-              <a:t>)</a:t>
-            </a:r>
-          </a:p>
-          <a:p>
-            <a:pPr marL="0" indent="0">
-              <a:buNone/>
-            </a:pPr>
-            <a:r>
-              <a:rPr lang="en-US" dirty="0"/>
-              <a:t>h</a:t>
-            </a:r>
-            <a:r>
-              <a:rPr lang="en-US" dirty="0" smtClean="0"/>
-              <a:t>elp(</a:t>
-            </a:r>
-            <a:r>
-              <a:rPr lang="en-US" dirty="0" err="1" smtClean="0"/>
-              <a:t>obj</a:t>
-            </a:r>
-            <a:r>
-              <a:rPr lang="en-US" dirty="0" smtClean="0"/>
-              <a:t>)</a:t>
             </a:r>
           </a:p>
         </p:txBody>
@@ -8100,13 +8091,8 @@
           <a:p>
             <a:r>
               <a:rPr lang="en-US" dirty="0" smtClean="0"/>
-              <a:t>Object oriented language - but you don’t have to </a:t>
-            </a:r>
-            <a:r>
-              <a:rPr lang="en-US" dirty="0" smtClean="0"/>
-              <a:t>create objects</a:t>
-            </a:r>
-            <a:endParaRPr lang="en-US" dirty="0" smtClean="0"/>
+              <a:t>Object oriented language - but you don’t have to create objects</a:t>
+            </a:r>
           </a:p>
           <a:p>
             <a:r>
@@ -8121,13 +8107,8 @@
           <a:p>
             <a:r>
               <a:rPr lang="en-US" dirty="0" smtClean="0"/>
-              <a:t>Considered a scripting language because it has an interactive </a:t>
-            </a:r>
-            <a:r>
-              <a:rPr lang="en-US" dirty="0" smtClean="0"/>
-              <a:t>shell</a:t>
-            </a:r>
-            <a:endParaRPr lang="en-US" dirty="0" smtClean="0"/>
+              <a:t>Considered a scripting language because it has an interactive shell</a:t>
+            </a:r>
           </a:p>
           <a:p>
             <a:endParaRPr lang="en-US" dirty="0" smtClean="0"/>
@@ -9002,11 +8983,7 @@
             </a:r>
             <a:r>
               <a:rPr lang="en-US" dirty="0" smtClean="0"/>
-              <a:t>) when timing is </a:t>
-            </a:r>
-            <a:r>
-              <a:rPr lang="en-US" dirty="0" smtClean="0"/>
-              <a:t>critical</a:t>
+              <a:t>) when timing is critical</a:t>
             </a:r>
           </a:p>
           <a:p>
@@ -9015,18 +8992,12 @@
               <a:rPr lang="en-US" dirty="0" smtClean="0"/>
               <a:t>‘C’ is used for near real-time interactions with physical devices.</a:t>
             </a:r>
-            <a:endParaRPr lang="en-US" dirty="0" smtClean="0"/>
-          </a:p>
-          <a:p>
-            <a:r>
-              <a:rPr lang="en-US" dirty="0" smtClean="0"/>
-              <a:t>Processor is extremely </a:t>
-            </a:r>
-            <a:r>
-              <a:rPr lang="en-US" dirty="0" smtClean="0"/>
-              <a:t>slow</a:t>
-            </a:r>
-            <a:endParaRPr lang="en-US" dirty="0" smtClean="0"/>
+          </a:p>
+          <a:p>
+            <a:r>
+              <a:rPr lang="en-US" dirty="0" smtClean="0"/>
+              <a:t>Processor is extremely slow</a:t>
+            </a:r>
           </a:p>
           <a:p>
             <a:r>
@@ -9168,13 +9139,8 @@
             </a:r>
             <a:r>
               <a:rPr lang="en-US" dirty="0" smtClean="0"/>
-              <a:t>“</a:t>
-            </a:r>
-            <a:r>
-              <a:rPr lang="en-US" dirty="0" smtClean="0"/>
-              <a:t>types/classes”</a:t>
-            </a:r>
-            <a:endParaRPr lang="en-US" dirty="0" smtClean="0"/>
+              <a:t>“types/classes”</a:t>
+            </a:r>
           </a:p>
           <a:p>
             <a:r>
@@ -9641,11 +9607,7 @@
             <a:pPr lvl="1"/>
             <a:r>
               <a:rPr lang="en-US" dirty="0" smtClean="0"/>
-              <a:t>Using IDLE -Select </a:t>
-            </a:r>
-            <a:r>
-              <a:rPr lang="en-US" dirty="0" smtClean="0"/>
-              <a:t>the appropriate version:</a:t>
+              <a:t>Using IDLE -Select the appropriate version:</a:t>
             </a:r>
           </a:p>
           <a:p>
@@ -9901,7 +9863,6 @@
               <a:rPr lang="en-US" dirty="0" smtClean="0"/>
               <a:t>Interactive – type ‘python’ on the command line</a:t>
             </a:r>
-            <a:endParaRPr lang="en-US" dirty="0" smtClean="0"/>
           </a:p>
           <a:p>
             <a:pPr lvl="1"/>
@@ -9934,15 +9895,7 @@
             <a:pPr lvl="2"/>
             <a:r>
               <a:rPr lang="en-US" dirty="0" smtClean="0"/>
-              <a:t>p</a:t>
-            </a:r>
-            <a:r>
-              <a:rPr lang="en-US" dirty="0" smtClean="0"/>
-              <a:t>ython </a:t>
-            </a:r>
-            <a:r>
-              <a:rPr lang="en-US" dirty="0" smtClean="0"/>
-              <a:t>script.py</a:t>
+              <a:t>python script.py</a:t>
             </a:r>
           </a:p>
           <a:p>

</xml_diff>

<commit_message>
Update to expand on Day 2 topics
</commit_message>
<xml_diff>
--- a/Python Introduction.pptx
+++ b/Python Introduction.pptx
@@ -13,21 +13,13 @@
     <p:sldId id="260" r:id="rId7"/>
     <p:sldId id="261" r:id="rId8"/>
     <p:sldId id="262" r:id="rId9"/>
-    <p:sldId id="275" r:id="rId10"/>
-    <p:sldId id="263" r:id="rId11"/>
-    <p:sldId id="265" r:id="rId12"/>
-    <p:sldId id="266" r:id="rId13"/>
-    <p:sldId id="264" r:id="rId14"/>
-    <p:sldId id="267" r:id="rId15"/>
-    <p:sldId id="268" r:id="rId16"/>
-    <p:sldId id="272" r:id="rId17"/>
-    <p:sldId id="274" r:id="rId18"/>
-    <p:sldId id="273" r:id="rId19"/>
-    <p:sldId id="269" r:id="rId20"/>
-    <p:sldId id="271" r:id="rId21"/>
-    <p:sldId id="276" r:id="rId22"/>
-    <p:sldId id="278" r:id="rId23"/>
-    <p:sldId id="277" r:id="rId24"/>
+    <p:sldId id="263" r:id="rId10"/>
+    <p:sldId id="265" r:id="rId11"/>
+    <p:sldId id="266" r:id="rId12"/>
+    <p:sldId id="264" r:id="rId13"/>
+    <p:sldId id="267" r:id="rId14"/>
+    <p:sldId id="268" r:id="rId15"/>
+    <p:sldId id="269" r:id="rId16"/>
   </p:sldIdLst>
   <p:sldSz cx="12192000" cy="6858000"/>
   <p:notesSz cx="6858000" cy="9144000"/>
@@ -320,7 +312,7 @@
           <a:p>
             <a:fld id="{4AAD347D-5ACD-4C99-B74B-A9C85AD731AF}" type="datetimeFigureOut">
               <a:rPr lang="en-US" dirty="0"/>
-              <a:t>10/8/2017</a:t>
+              <a:t>10/17/2017</a:t>
             </a:fld>
             <a:endParaRPr lang="en-US" dirty="0"/>
           </a:p>
@@ -590,7 +582,7 @@
           <a:p>
             <a:fld id="{4509A250-FF31-4206-8172-F9D3106AACB1}" type="datetimeFigureOut">
               <a:rPr lang="en-US" dirty="0"/>
-              <a:t>10/8/2017</a:t>
+              <a:t>10/17/2017</a:t>
             </a:fld>
             <a:endParaRPr lang="en-US" dirty="0"/>
           </a:p>
@@ -779,7 +771,7 @@
           <a:p>
             <a:fld id="{4509A250-FF31-4206-8172-F9D3106AACB1}" type="datetimeFigureOut">
               <a:rPr lang="en-US" dirty="0"/>
-              <a:t>10/8/2017</a:t>
+              <a:t>10/17/2017</a:t>
             </a:fld>
             <a:endParaRPr lang="en-US" dirty="0"/>
           </a:p>
@@ -1045,7 +1037,7 @@
           <a:p>
             <a:fld id="{4509A250-FF31-4206-8172-F9D3106AACB1}" type="datetimeFigureOut">
               <a:rPr lang="en-US" dirty="0"/>
-              <a:t>10/8/2017</a:t>
+              <a:t>10/17/2017</a:t>
             </a:fld>
             <a:endParaRPr lang="en-US" dirty="0"/>
           </a:p>
@@ -1367,7 +1359,7 @@
           <a:p>
             <a:fld id="{4509A250-FF31-4206-8172-F9D3106AACB1}" type="datetimeFigureOut">
               <a:rPr lang="en-US" dirty="0"/>
-              <a:t>10/8/2017</a:t>
+              <a:t>10/17/2017</a:t>
             </a:fld>
             <a:endParaRPr lang="en-US" dirty="0"/>
           </a:p>
@@ -1981,7 +1973,7 @@
           <a:p>
             <a:fld id="{4509A250-FF31-4206-8172-F9D3106AACB1}" type="datetimeFigureOut">
               <a:rPr lang="en-US" dirty="0"/>
-              <a:t>10/8/2017</a:t>
+              <a:t>10/17/2017</a:t>
             </a:fld>
             <a:endParaRPr lang="en-US" dirty="0"/>
           </a:p>
@@ -2823,7 +2815,7 @@
           <a:p>
             <a:fld id="{4509A250-FF31-4206-8172-F9D3106AACB1}" type="datetimeFigureOut">
               <a:rPr lang="en-US" dirty="0"/>
-              <a:t>10/8/2017</a:t>
+              <a:t>10/17/2017</a:t>
             </a:fld>
             <a:endParaRPr lang="en-US" dirty="0"/>
           </a:p>
@@ -2988,7 +2980,7 @@
           <a:p>
             <a:fld id="{4509A250-FF31-4206-8172-F9D3106AACB1}" type="datetimeFigureOut">
               <a:rPr lang="en-US" dirty="0"/>
-              <a:t>10/8/2017</a:t>
+              <a:t>10/17/2017</a:t>
             </a:fld>
             <a:endParaRPr lang="en-US" dirty="0"/>
           </a:p>
@@ -3163,7 +3155,7 @@
           <a:p>
             <a:fld id="{4509A250-FF31-4206-8172-F9D3106AACB1}" type="datetimeFigureOut">
               <a:rPr lang="en-US" dirty="0"/>
-              <a:t>10/8/2017</a:t>
+              <a:t>10/17/2017</a:t>
             </a:fld>
             <a:endParaRPr lang="en-US" dirty="0"/>
           </a:p>
@@ -3328,7 +3320,7 @@
           <a:p>
             <a:fld id="{9796027F-7875-4030-9381-8BD8C4F21935}" type="datetimeFigureOut">
               <a:rPr lang="en-US" dirty="0"/>
-              <a:t>10/8/2017</a:t>
+              <a:t>10/17/2017</a:t>
             </a:fld>
             <a:endParaRPr lang="en-US" dirty="0"/>
           </a:p>
@@ -3570,7 +3562,7 @@
           <a:p>
             <a:fld id="{9796027F-7875-4030-9381-8BD8C4F21935}" type="datetimeFigureOut">
               <a:rPr lang="en-US" dirty="0"/>
-              <a:t>10/8/2017</a:t>
+              <a:t>10/17/2017</a:t>
             </a:fld>
             <a:endParaRPr lang="en-US" dirty="0"/>
           </a:p>
@@ -3857,7 +3849,7 @@
           <a:p>
             <a:fld id="{9796027F-7875-4030-9381-8BD8C4F21935}" type="datetimeFigureOut">
               <a:rPr lang="en-US" dirty="0"/>
-              <a:t>10/8/2017</a:t>
+              <a:t>10/17/2017</a:t>
             </a:fld>
             <a:endParaRPr lang="en-US" dirty="0"/>
           </a:p>
@@ -4296,7 +4288,7 @@
           <a:p>
             <a:fld id="{9796027F-7875-4030-9381-8BD8C4F21935}" type="datetimeFigureOut">
               <a:rPr lang="en-US" dirty="0"/>
-              <a:t>10/8/2017</a:t>
+              <a:t>10/17/2017</a:t>
             </a:fld>
             <a:endParaRPr lang="en-US" dirty="0"/>
           </a:p>
@@ -4409,7 +4401,7 @@
           <a:p>
             <a:fld id="{4509A250-FF31-4206-8172-F9D3106AACB1}" type="datetimeFigureOut">
               <a:rPr lang="en-US" dirty="0"/>
-              <a:t>10/8/2017</a:t>
+              <a:t>10/17/2017</a:t>
             </a:fld>
             <a:endParaRPr lang="en-US" dirty="0"/>
           </a:p>
@@ -4499,7 +4491,7 @@
           <a:p>
             <a:fld id="{4509A250-FF31-4206-8172-F9D3106AACB1}" type="datetimeFigureOut">
               <a:rPr lang="en-US" dirty="0"/>
-              <a:t>10/8/2017</a:t>
+              <a:t>10/17/2017</a:t>
             </a:fld>
             <a:endParaRPr lang="en-US" dirty="0"/>
           </a:p>
@@ -4773,7 +4765,7 @@
           <a:p>
             <a:fld id="{4509A250-FF31-4206-8172-F9D3106AACB1}" type="datetimeFigureOut">
               <a:rPr lang="en-US" dirty="0"/>
-              <a:t>10/8/2017</a:t>
+              <a:t>10/17/2017</a:t>
             </a:fld>
             <a:endParaRPr lang="en-US" dirty="0"/>
           </a:p>
@@ -5043,7 +5035,7 @@
           <a:p>
             <a:fld id="{4509A250-FF31-4206-8172-F9D3106AACB1}" type="datetimeFigureOut">
               <a:rPr lang="en-US" dirty="0"/>
-              <a:t>10/8/2017</a:t>
+              <a:t>10/17/2017</a:t>
             </a:fld>
             <a:endParaRPr lang="en-US" dirty="0"/>
           </a:p>
@@ -5461,7 +5453,7 @@
           <a:p>
             <a:fld id="{4AAD347D-5ACD-4C99-B74B-A9C85AD731AF}" type="datetimeFigureOut">
               <a:rPr lang="en-US" dirty="0"/>
-              <a:t>10/8/2017</a:t>
+              <a:t>10/17/2017</a:t>
             </a:fld>
             <a:endParaRPr lang="en-US" dirty="0"/>
           </a:p>
@@ -6067,7 +6059,7 @@
           <a:p>
             <a:r>
               <a:rPr lang="en-US" dirty="0" smtClean="0"/>
-              <a:t>Development Environments</a:t>
+              <a:t>Why is Python considered a scripting Language?</a:t>
             </a:r>
             <a:endParaRPr lang="en-US" dirty="0"/>
           </a:p>
@@ -6085,104 +6077,50 @@
         </p:nvSpPr>
         <p:spPr/>
         <p:txBody>
-          <a:bodyPr>
-            <a:normAutofit lnSpcReduction="10000"/>
-          </a:bodyPr>
-          <a:lstStyle/>
-          <a:p>
-            <a:r>
-              <a:rPr lang="en-US" dirty="0" smtClean="0"/>
-              <a:t>IDLE – included with Windows and Mac distributions</a:t>
+          <a:bodyPr/>
+          <a:lstStyle/>
+          <a:p>
+            <a:r>
+              <a:rPr lang="en-US" dirty="0" smtClean="0"/>
+              <a:t>Python commands are inspected within an interactive interpreter</a:t>
             </a:r>
           </a:p>
           <a:p>
             <a:pPr lvl="1"/>
             <a:r>
               <a:rPr lang="en-US" dirty="0" smtClean="0"/>
-              <a:t>Good enough for fairly simple things, including this course</a:t>
-            </a:r>
-          </a:p>
-          <a:p>
-            <a:pPr marL="400050"/>
-            <a:r>
-              <a:rPr lang="en-US" dirty="0" err="1" smtClean="0"/>
-              <a:t>PyCharm</a:t>
-            </a:r>
-            <a:r>
-              <a:rPr lang="en-US" dirty="0" smtClean="0"/>
-              <a:t> – Community edition</a:t>
-            </a:r>
-          </a:p>
-          <a:p>
-            <a:pPr marL="800100" lvl="1"/>
-            <a:r>
-              <a:rPr lang="en-US" dirty="0" smtClean="0"/>
-              <a:t>Shares basic structure with other Jet Brains IDEs</a:t>
-            </a:r>
-          </a:p>
-          <a:p>
-            <a:pPr marL="1200150" lvl="2"/>
-            <a:r>
-              <a:rPr lang="en-US" dirty="0" err="1" smtClean="0"/>
-              <a:t>Intelli</a:t>
-            </a:r>
-            <a:r>
-              <a:rPr lang="en-US" dirty="0" smtClean="0"/>
-              <a:t>-J </a:t>
-            </a:r>
-            <a:r>
-              <a:rPr lang="en-US" dirty="0"/>
-              <a:t>(</a:t>
-            </a:r>
-            <a:r>
-              <a:rPr lang="en-US" dirty="0" smtClean="0"/>
-              <a:t>Android and other Java development)</a:t>
-            </a:r>
-          </a:p>
-          <a:p>
-            <a:pPr marL="1200150" lvl="2"/>
-            <a:r>
-              <a:rPr lang="en-US" dirty="0" err="1" smtClean="0"/>
-              <a:t>WebStorm</a:t>
-            </a:r>
-            <a:endParaRPr lang="en-US" dirty="0" smtClean="0"/>
-          </a:p>
-          <a:p>
-            <a:pPr marL="1200150" lvl="2"/>
-            <a:r>
-              <a:rPr lang="en-US" dirty="0" err="1" smtClean="0"/>
-              <a:t>RubyMine</a:t>
-            </a:r>
-            <a:endParaRPr lang="en-US" dirty="0" smtClean="0"/>
-          </a:p>
-          <a:p>
-            <a:pPr marL="1200150" lvl="2"/>
-            <a:r>
-              <a:rPr lang="en-US" dirty="0" err="1" smtClean="0"/>
-              <a:t>AppCode</a:t>
-            </a:r>
-            <a:endParaRPr lang="en-US" dirty="0" smtClean="0"/>
-          </a:p>
-          <a:p>
-            <a:pPr marL="800100" lvl="1"/>
-            <a:r>
-              <a:rPr lang="en-US" dirty="0" smtClean="0"/>
-              <a:t>Allows you to choose Python version if your system has more than one.</a:t>
-            </a:r>
-          </a:p>
-          <a:p>
-            <a:pPr marL="400050"/>
-            <a:r>
-              <a:rPr lang="en-US" dirty="0" smtClean="0"/>
-              <a:t>Investigate other IDEs:</a:t>
-            </a:r>
-          </a:p>
-          <a:p>
-            <a:pPr marL="800100" lvl="1"/>
-            <a:r>
-              <a:rPr lang="en-US" dirty="0" smtClean="0"/>
-              <a:t>https://www.quora.com/What-is-the-best-IDE-for-Python</a:t>
-            </a:r>
+              <a:t>Python will execute a command (almost) every time you press enter</a:t>
+            </a:r>
+          </a:p>
+          <a:p>
+            <a:r>
+              <a:rPr lang="en-US" dirty="0" smtClean="0"/>
+              <a:t>There is only an interpreter</a:t>
+            </a:r>
+          </a:p>
+          <a:p>
+            <a:pPr lvl="1"/>
+            <a:r>
+              <a:rPr lang="en-US" dirty="0" smtClean="0"/>
+              <a:t>No standalone compiler (C, C++, C#, Java)</a:t>
+            </a:r>
+          </a:p>
+          <a:p>
+            <a:pPr lvl="1"/>
+            <a:r>
+              <a:rPr lang="en-US" dirty="0" smtClean="0"/>
+              <a:t>No link phase (C, C++)</a:t>
+            </a:r>
+          </a:p>
+          <a:p>
+            <a:pPr lvl="1"/>
+            <a:r>
+              <a:rPr lang="en-US" dirty="0" smtClean="0"/>
+              <a:t>You only find syntax errors when the interpreter executes a line of code</a:t>
+            </a:r>
+          </a:p>
+          <a:p>
+            <a:pPr lvl="1"/>
             <a:endParaRPr lang="en-US" dirty="0"/>
           </a:p>
         </p:txBody>
@@ -6190,7 +6128,7 @@
     </p:spTree>
     <p:extLst>
       <p:ext uri="{BB962C8B-B14F-4D97-AF65-F5344CB8AC3E}">
-        <p14:creationId xmlns:p14="http://schemas.microsoft.com/office/powerpoint/2010/main" val="3606567790"/>
+        <p14:creationId xmlns:p14="http://schemas.microsoft.com/office/powerpoint/2010/main" val="3859327121"/>
       </p:ext>
     </p:extLst>
   </p:cSld>
@@ -6234,7 +6172,7 @@
           <a:p>
             <a:r>
               <a:rPr lang="en-US" dirty="0" smtClean="0"/>
-              <a:t>Why is Python considered a scripting Language?</a:t>
+              <a:t>Object Types</a:t>
             </a:r>
             <a:endParaRPr lang="en-US" dirty="0"/>
           </a:p>
@@ -6252,65 +6190,164 @@
         </p:nvSpPr>
         <p:spPr/>
         <p:txBody>
-          <a:bodyPr/>
-          <a:lstStyle/>
-          <a:p>
-            <a:r>
-              <a:rPr lang="en-US" dirty="0" smtClean="0"/>
-              <a:t>Python commands are inspected within an interactive interpreter</a:t>
+          <a:bodyPr>
+            <a:normAutofit fontScale="92500" lnSpcReduction="10000"/>
+          </a:bodyPr>
+          <a:lstStyle/>
+          <a:p>
+            <a:r>
+              <a:rPr lang="en-US" dirty="0" smtClean="0"/>
+              <a:t>Numbers:	An integer or floating point value</a:t>
             </a:r>
           </a:p>
           <a:p>
             <a:pPr lvl="1"/>
             <a:r>
               <a:rPr lang="en-US" dirty="0" smtClean="0"/>
-              <a:t>Python will execute a command (almost) every time you press enter</a:t>
-            </a:r>
-          </a:p>
-          <a:p>
-            <a:r>
-              <a:rPr lang="en-US" dirty="0" smtClean="0"/>
-              <a:t>There is only an interpreter</a:t>
+              <a:t>Integers	</a:t>
+            </a:r>
+            <a:r>
+              <a:rPr lang="en-US" dirty="0" err="1" smtClean="0"/>
+              <a:t>obj</a:t>
+            </a:r>
+            <a:r>
+              <a:rPr lang="en-US" dirty="0" smtClean="0"/>
+              <a:t>=1, </a:t>
+            </a:r>
+            <a:r>
+              <a:rPr lang="en-US" dirty="0" err="1" smtClean="0"/>
+              <a:t>obj</a:t>
+            </a:r>
+            <a:r>
+              <a:rPr lang="en-US" dirty="0" smtClean="0"/>
+              <a:t>=1.0</a:t>
+            </a:r>
+          </a:p>
+          <a:p>
+            <a:r>
+              <a:rPr lang="en-US" dirty="0" smtClean="0"/>
+              <a:t>Strings: 		any number of characters enclosed in quotes (‘ or “)</a:t>
             </a:r>
           </a:p>
           <a:p>
             <a:pPr lvl="1"/>
             <a:r>
-              <a:rPr lang="en-US" dirty="0" smtClean="0"/>
-              <a:t>No standalone compiler (C, C++, C#, Java)</a:t>
+              <a:rPr lang="en-US" dirty="0" err="1" smtClean="0"/>
+              <a:t>obj</a:t>
+            </a:r>
+            <a:r>
+              <a:rPr lang="en-US" dirty="0" smtClean="0"/>
+              <a:t>=‘a’, </a:t>
+            </a:r>
+            <a:r>
+              <a:rPr lang="en-US" dirty="0" err="1" smtClean="0"/>
+              <a:t>obj</a:t>
+            </a:r>
+            <a:r>
+              <a:rPr lang="en-US" dirty="0" smtClean="0"/>
+              <a:t>=“b”  or  </a:t>
+            </a:r>
+            <a:r>
+              <a:rPr lang="en-US" dirty="0" err="1" smtClean="0"/>
+              <a:t>obj</a:t>
+            </a:r>
+            <a:r>
+              <a:rPr lang="en-US" dirty="0" smtClean="0"/>
+              <a:t>=‘Something longer’</a:t>
+            </a:r>
+          </a:p>
+          <a:p>
+            <a:r>
+              <a:rPr lang="en-US" dirty="0" smtClean="0"/>
+              <a:t>Lists:			A group of objects in a particular order</a:t>
             </a:r>
           </a:p>
           <a:p>
             <a:pPr lvl="1"/>
             <a:r>
-              <a:rPr lang="en-US" dirty="0" smtClean="0"/>
-              <a:t>No link phase (C, C++)</a:t>
+              <a:rPr lang="en-US" dirty="0" err="1" smtClean="0"/>
+              <a:t>obj</a:t>
+            </a:r>
+            <a:r>
+              <a:rPr lang="en-US" dirty="0" smtClean="0"/>
+              <a:t>=[1,2,3], </a:t>
+            </a:r>
+            <a:r>
+              <a:rPr lang="en-US" dirty="0" err="1" smtClean="0"/>
+              <a:t>obj</a:t>
+            </a:r>
+            <a:r>
+              <a:rPr lang="en-US" dirty="0" smtClean="0"/>
+              <a:t>=[1,2,’string’,3.0], </a:t>
+            </a:r>
+            <a:r>
+              <a:rPr lang="en-US" dirty="0" err="1" smtClean="0"/>
+              <a:t>obj</a:t>
+            </a:r>
+            <a:r>
+              <a:rPr lang="en-US" dirty="0" smtClean="0"/>
+              <a:t>=[[1,2],[2,3,4],’</a:t>
+            </a:r>
+            <a:r>
+              <a:rPr lang="en-US" dirty="0" err="1" smtClean="0"/>
+              <a:t>str</a:t>
+            </a:r>
+            <a:r>
+              <a:rPr lang="en-US" dirty="0" smtClean="0"/>
+              <a:t>’]</a:t>
+            </a:r>
+          </a:p>
+          <a:p>
+            <a:r>
+              <a:rPr lang="en-US" dirty="0" smtClean="0"/>
+              <a:t>Dictionary	A group of keys and values with no order</a:t>
             </a:r>
           </a:p>
           <a:p>
             <a:pPr lvl="1"/>
             <a:r>
-              <a:rPr lang="en-US" dirty="0" smtClean="0"/>
-              <a:t>You only find syntax errors when the interpreter executes a line of code</a:t>
-            </a:r>
-          </a:p>
-          <a:p>
-            <a:pPr lvl="2"/>
-            <a:r>
-              <a:rPr lang="en-US" dirty="0" smtClean="0"/>
-              <a:t>There are tools that will alert you about a lot of typos.</a:t>
+              <a:rPr lang="en-US" dirty="0" err="1" smtClean="0"/>
+              <a:t>obj</a:t>
+            </a:r>
+            <a:r>
+              <a:rPr lang="en-US" dirty="0" smtClean="0"/>
+              <a:t>={‘k1’:v1, ‘k2’:[1,2,3], ‘k4’:{‘k4k1’:k4v1}, ‘k5’:’str’}</a:t>
+            </a:r>
+          </a:p>
+          <a:p>
+            <a:r>
+              <a:rPr lang="en-US" dirty="0" smtClean="0"/>
+              <a:t>Sets:			An Immutable list of objects with no repeating values</a:t>
             </a:r>
           </a:p>
           <a:p>
             <a:pPr lvl="1"/>
-            <a:endParaRPr lang="en-US" dirty="0"/>
+            <a:r>
+              <a:rPr lang="en-US" dirty="0" err="1" smtClean="0"/>
+              <a:t>obj</a:t>
+            </a:r>
+            <a:r>
+              <a:rPr lang="en-US" dirty="0" smtClean="0"/>
+              <a:t>=set([1,2,’string’,{},[], 5.0])</a:t>
+            </a:r>
+          </a:p>
+          <a:p>
+            <a:r>
+              <a:rPr lang="en-US" dirty="0" smtClean="0"/>
+              <a:t>Generator	A list where the elements are created </a:t>
+            </a:r>
+            <a:r>
+              <a:rPr lang="en-US" smtClean="0"/>
+              <a:t>when requested</a:t>
+            </a:r>
+            <a:endParaRPr lang="en-US" dirty="0" smtClean="0"/>
           </a:p>
         </p:txBody>
       </p:sp>
     </p:spTree>
     <p:extLst>
       <p:ext uri="{BB962C8B-B14F-4D97-AF65-F5344CB8AC3E}">
-        <p14:creationId xmlns:p14="http://schemas.microsoft.com/office/powerpoint/2010/main" val="3859327121"/>
+        <p14:creationId xmlns:p14="http://schemas.microsoft.com/office/powerpoint/2010/main" val="3167024840"/>
       </p:ext>
     </p:extLst>
   </p:cSld>
@@ -6354,13 +6391,9 @@
           <a:p>
             <a:r>
               <a:rPr lang="en-US" dirty="0" smtClean="0"/>
-              <a:t>Object Types </a:t>
-            </a:r>
-            <a:r>
-              <a:rPr lang="en-US" sz="3200" dirty="0" smtClean="0"/>
-              <a:t>(everything’s an object)</a:t>
-            </a:r>
-            <a:endParaRPr lang="en-US" sz="3200" dirty="0"/>
+              <a:t>Inspecting objects</a:t>
+            </a:r>
+            <a:endParaRPr lang="en-US" dirty="0"/>
           </a:p>
         </p:txBody>
       </p:sp>
@@ -6377,20 +6410,60 @@
         <p:spPr/>
         <p:txBody>
           <a:bodyPr>
-            <a:normAutofit fontScale="85000" lnSpcReduction="10000"/>
+            <a:normAutofit fontScale="92500" lnSpcReduction="20000"/>
           </a:bodyPr>
           <a:lstStyle/>
           <a:p>
             <a:r>
               <a:rPr lang="en-US" dirty="0" smtClean="0"/>
-              <a:t>Numbers:	An integer or floating point value</a:t>
+              <a:t>Objects have</a:t>
             </a:r>
           </a:p>
           <a:p>
             <a:pPr lvl="1"/>
             <a:r>
               <a:rPr lang="en-US" dirty="0" smtClean="0"/>
-              <a:t>Integers	</a:t>
+              <a:t>Values/States</a:t>
+            </a:r>
+          </a:p>
+          <a:p>
+            <a:pPr lvl="1"/>
+            <a:r>
+              <a:rPr lang="en-US" dirty="0" smtClean="0"/>
+              <a:t>Functions</a:t>
+            </a:r>
+          </a:p>
+          <a:p>
+            <a:pPr lvl="1"/>
+            <a:r>
+              <a:rPr lang="en-US" dirty="0" smtClean="0"/>
+              <a:t>Lifetimes</a:t>
+            </a:r>
+          </a:p>
+          <a:p>
+            <a:pPr lvl="1"/>
+            <a:r>
+              <a:rPr lang="en-US" dirty="0" smtClean="0"/>
+              <a:t>Documentation</a:t>
+            </a:r>
+          </a:p>
+          <a:p>
+            <a:pPr marL="0" indent="0">
+              <a:buNone/>
+            </a:pPr>
+            <a:endParaRPr lang="en-US" dirty="0"/>
+          </a:p>
+          <a:p>
+            <a:pPr marL="0" indent="0">
+              <a:buNone/>
+            </a:pPr>
+            <a:r>
+              <a:rPr lang="en-US" dirty="0" err="1" smtClean="0"/>
+              <a:t>def</a:t>
+            </a:r>
+            <a:r>
+              <a:rPr lang="en-US" dirty="0" smtClean="0"/>
+              <a:t> dump(</a:t>
             </a:r>
             <a:r>
               <a:rPr lang="en-US" dirty="0" err="1" smtClean="0"/>
@@ -6398,14 +6471,32 @@
             </a:r>
             <a:r>
               <a:rPr lang="en-US" dirty="0" smtClean="0"/>
-              <a:t>=1</a:t>
-            </a:r>
-          </a:p>
-          <a:p>
-            <a:pPr lvl="1"/>
-            <a:r>
-              <a:rPr lang="en-US" dirty="0" smtClean="0"/>
-              <a:t>Float		</a:t>
+              <a:t>):</a:t>
+            </a:r>
+          </a:p>
+          <a:p>
+            <a:pPr marL="0" indent="0">
+              <a:buNone/>
+            </a:pPr>
+            <a:r>
+              <a:rPr lang="en-US" dirty="0" smtClean="0"/>
+              <a:t>	for </a:t>
+            </a:r>
+            <a:r>
+              <a:rPr lang="en-US" dirty="0" err="1" smtClean="0"/>
+              <a:t>attr</a:t>
+            </a:r>
+            <a:r>
+              <a:rPr lang="en-US" dirty="0" smtClean="0"/>
+              <a:t> in </a:t>
+            </a:r>
+            <a:r>
+              <a:rPr lang="en-US" dirty="0" err="1" smtClean="0"/>
+              <a:t>dir</a:t>
+            </a:r>
+            <a:r>
+              <a:rPr lang="en-US" dirty="0" smtClean="0"/>
+              <a:t>(</a:t>
             </a:r>
             <a:r>
               <a:rPr lang="en-US" dirty="0" err="1" smtClean="0"/>
@@ -6413,32 +6504,62 @@
             </a:r>
             <a:r>
               <a:rPr lang="en-US" dirty="0" smtClean="0"/>
-              <a:t>=1.0</a:t>
-            </a:r>
-          </a:p>
-          <a:p>
-            <a:r>
-              <a:rPr lang="en-US" dirty="0" smtClean="0"/>
-              <a:t>Strings: 		</a:t>
-            </a:r>
-            <a:r>
-              <a:rPr lang="en-US" dirty="0" smtClean="0"/>
-              <a:t>An immutable list of </a:t>
-            </a:r>
-            <a:r>
-              <a:rPr lang="en-US" dirty="0" smtClean="0"/>
-              <a:t>characters enclosed in quotes (‘ or “)</a:t>
-            </a:r>
-          </a:p>
-          <a:p>
-            <a:pPr lvl="1"/>
+              <a:t>):</a:t>
+            </a:r>
+            <a:br>
+              <a:rPr lang="en-US" dirty="0" smtClean="0"/>
+            </a:br>
+            <a:r>
+              <a:rPr lang="en-US" dirty="0" smtClean="0"/>
+              <a:t>		print(‘obj.{} = {}’.format(</a:t>
+            </a:r>
+            <a:r>
+              <a:rPr lang="en-US" dirty="0" err="1" smtClean="0"/>
+              <a:t>attr</a:t>
+            </a:r>
+            <a:r>
+              <a:rPr lang="en-US" dirty="0" smtClean="0"/>
+              <a:t>, </a:t>
+            </a:r>
+            <a:r>
+              <a:rPr lang="en-US" dirty="0" err="1" smtClean="0"/>
+              <a:t>getattr</a:t>
+            </a:r>
+            <a:r>
+              <a:rPr lang="en-US" dirty="0" smtClean="0"/>
+              <a:t>(</a:t>
+            </a:r>
             <a:r>
               <a:rPr lang="en-US" dirty="0" err="1" smtClean="0"/>
               <a:t>obj</a:t>
             </a:r>
             <a:r>
               <a:rPr lang="en-US" dirty="0" smtClean="0"/>
-              <a:t>=‘a’, </a:t>
+              <a:t>, </a:t>
+            </a:r>
+            <a:r>
+              <a:rPr lang="en-US" dirty="0" err="1" smtClean="0"/>
+              <a:t>attr</a:t>
+            </a:r>
+            <a:r>
+              <a:rPr lang="en-US" dirty="0" smtClean="0"/>
+              <a:t>)))</a:t>
+            </a:r>
+            <a:endParaRPr lang="en-US" dirty="0"/>
+          </a:p>
+          <a:p>
+            <a:pPr marL="0" indent="0">
+              <a:buNone/>
+            </a:pPr>
+            <a:endParaRPr lang="en-US" dirty="0" smtClean="0"/>
+          </a:p>
+          <a:p>
+            <a:pPr marL="0" indent="0">
+              <a:buNone/>
+            </a:pPr>
+            <a:r>
+              <a:rPr lang="en-US" dirty="0" smtClean="0"/>
+              <a:t>print(</a:t>
             </a:r>
             <a:r>
               <a:rPr lang="en-US" dirty="0" err="1" smtClean="0"/>
@@ -6446,7 +6567,20 @@
             </a:r>
             <a:r>
               <a:rPr lang="en-US" dirty="0" smtClean="0"/>
-              <a:t>=“b” , </a:t>
+              <a:t>.__doc__)</a:t>
+            </a:r>
+          </a:p>
+          <a:p>
+            <a:pPr marL="0" indent="0">
+              <a:buNone/>
+            </a:pPr>
+            <a:r>
+              <a:rPr lang="en-US" dirty="0"/>
+              <a:t>t</a:t>
+            </a:r>
+            <a:r>
+              <a:rPr lang="en-US" dirty="0" smtClean="0"/>
+              <a:t>ype(</a:t>
             </a:r>
             <a:r>
               <a:rPr lang="en-US" dirty="0" err="1" smtClean="0"/>
@@ -6454,96 +6588,7 @@
             </a:r>
             <a:r>
               <a:rPr lang="en-US" dirty="0" smtClean="0"/>
-              <a:t>=‘Something longer’, </a:t>
-            </a:r>
-            <a:r>
-              <a:rPr lang="en-US" dirty="0" err="1" smtClean="0"/>
-              <a:t>obj</a:t>
-            </a:r>
-            <a:r>
-              <a:rPr lang="en-US" dirty="0" smtClean="0"/>
-              <a:t> = ‘something with ”something” else’</a:t>
-            </a:r>
-          </a:p>
-          <a:p>
-            <a:r>
-              <a:rPr lang="en-US" dirty="0" smtClean="0"/>
-              <a:t>Lists:			A group of objects in a particular order</a:t>
-            </a:r>
-          </a:p>
-          <a:p>
-            <a:pPr lvl="1"/>
-            <a:r>
-              <a:rPr lang="en-US" dirty="0" err="1" smtClean="0"/>
-              <a:t>obj</a:t>
-            </a:r>
-            <a:r>
-              <a:rPr lang="en-US" dirty="0" smtClean="0"/>
-              <a:t>=[1,2,3], </a:t>
-            </a:r>
-            <a:r>
-              <a:rPr lang="en-US" dirty="0" err="1" smtClean="0"/>
-              <a:t>obj</a:t>
-            </a:r>
-            <a:r>
-              <a:rPr lang="en-US" dirty="0" smtClean="0"/>
-              <a:t>=[1,2,’string’,3.0], </a:t>
-            </a:r>
-            <a:r>
-              <a:rPr lang="en-US" dirty="0" err="1" smtClean="0"/>
-              <a:t>obj</a:t>
-            </a:r>
-            <a:r>
-              <a:rPr lang="en-US" dirty="0" smtClean="0"/>
-              <a:t>=[[1,2],[2,3,4],’</a:t>
-            </a:r>
-            <a:r>
-              <a:rPr lang="en-US" dirty="0" err="1" smtClean="0"/>
-              <a:t>str</a:t>
-            </a:r>
-            <a:r>
-              <a:rPr lang="en-US" dirty="0" smtClean="0"/>
-              <a:t>’]</a:t>
-            </a:r>
-          </a:p>
-          <a:p>
-            <a:r>
-              <a:rPr lang="en-US" dirty="0" smtClean="0"/>
-              <a:t>Dictionary	A group of keys and values with no order</a:t>
-            </a:r>
-          </a:p>
-          <a:p>
-            <a:pPr lvl="1"/>
-            <a:r>
-              <a:rPr lang="en-US" dirty="0" err="1" smtClean="0"/>
-              <a:t>obj</a:t>
-            </a:r>
-            <a:r>
-              <a:rPr lang="en-US" dirty="0" smtClean="0"/>
-              <a:t>={‘k1’:v1, ‘k2’:[1,2,3], ‘k4’:{‘k4k1’:k4v1}, ‘k5’:’str’}</a:t>
-            </a:r>
-          </a:p>
-          <a:p>
-            <a:r>
-              <a:rPr lang="en-US" dirty="0" smtClean="0"/>
-              <a:t>Sets:			An Immutable list of objects with no repeating values</a:t>
-            </a:r>
-          </a:p>
-          <a:p>
-            <a:pPr lvl="1"/>
-            <a:r>
-              <a:rPr lang="en-US" dirty="0" err="1" smtClean="0"/>
-              <a:t>obj</a:t>
-            </a:r>
-            <a:r>
-              <a:rPr lang="en-US" dirty="0" smtClean="0"/>
-              <a:t>=set([1,2,’string’,{},[], 5.0])</a:t>
-            </a:r>
-          </a:p>
-          <a:p>
-            <a:r>
-              <a:rPr lang="en-US" dirty="0" smtClean="0"/>
-              <a:t>Generator	A list where the elements are created when requested</a:t>
+              <a:t>)</a:t>
             </a:r>
           </a:p>
         </p:txBody>
@@ -6551,7 +6596,7 @@
     </p:spTree>
     <p:extLst>
       <p:ext uri="{BB962C8B-B14F-4D97-AF65-F5344CB8AC3E}">
-        <p14:creationId xmlns:p14="http://schemas.microsoft.com/office/powerpoint/2010/main" val="3167024840"/>
+        <p14:creationId xmlns:p14="http://schemas.microsoft.com/office/powerpoint/2010/main" val="113168731"/>
       </p:ext>
     </p:extLst>
   </p:cSld>
@@ -6595,7 +6640,15 @@
           <a:p>
             <a:r>
               <a:rPr lang="en-US" dirty="0" smtClean="0"/>
-              <a:t>Inspecting objects</a:t>
+              <a:t>Interactive </a:t>
+            </a:r>
+            <a:r>
+              <a:rPr lang="en-US" dirty="0" err="1" smtClean="0"/>
+              <a:t>Demnstration</a:t>
+            </a:r>
+            <a:r>
+              <a:rPr lang="en-US" dirty="0" smtClean="0"/>
+              <a:t>	</a:t>
             </a:r>
             <a:endParaRPr lang="en-US" dirty="0"/>
           </a:p>
@@ -6613,222 +6666,33 @@
         </p:nvSpPr>
         <p:spPr/>
         <p:txBody>
-          <a:bodyPr>
-            <a:normAutofit fontScale="85000" lnSpcReduction="20000"/>
-          </a:bodyPr>
-          <a:lstStyle/>
-          <a:p>
-            <a:r>
-              <a:rPr lang="en-US" dirty="0" smtClean="0"/>
-              <a:t>Objects have</a:t>
-            </a:r>
-          </a:p>
-          <a:p>
-            <a:pPr lvl="1"/>
-            <a:r>
-              <a:rPr lang="en-US" dirty="0" smtClean="0"/>
-              <a:t>Values/States</a:t>
-            </a:r>
-          </a:p>
-          <a:p>
-            <a:pPr lvl="1"/>
-            <a:r>
-              <a:rPr lang="en-US" dirty="0" smtClean="0"/>
-              <a:t>Functions</a:t>
-            </a:r>
-          </a:p>
-          <a:p>
-            <a:pPr lvl="1"/>
-            <a:r>
-              <a:rPr lang="en-US" dirty="0" smtClean="0"/>
-              <a:t>Lifetimes</a:t>
-            </a:r>
-          </a:p>
-          <a:p>
-            <a:pPr lvl="1"/>
-            <a:r>
-              <a:rPr lang="en-US" dirty="0" smtClean="0"/>
-              <a:t>Documentation</a:t>
-            </a:r>
-          </a:p>
-          <a:p>
-            <a:pPr marL="0" indent="0">
-              <a:buNone/>
-            </a:pPr>
-            <a:endParaRPr lang="en-US" dirty="0"/>
-          </a:p>
-          <a:p>
-            <a:pPr marL="0" indent="0">
-              <a:buNone/>
-            </a:pPr>
-            <a:r>
-              <a:rPr lang="en-US" dirty="0"/>
-              <a:t>type(</a:t>
-            </a:r>
-            <a:r>
-              <a:rPr lang="en-US" dirty="0" err="1"/>
-              <a:t>obj</a:t>
-            </a:r>
-            <a:r>
-              <a:rPr lang="en-US" dirty="0"/>
-              <a:t>)</a:t>
-            </a:r>
-          </a:p>
-          <a:p>
-            <a:pPr marL="0" indent="0">
-              <a:buNone/>
-            </a:pPr>
-            <a:r>
-              <a:rPr lang="en-US" dirty="0"/>
-              <a:t>help(</a:t>
-            </a:r>
-            <a:r>
-              <a:rPr lang="en-US" dirty="0" err="1"/>
-              <a:t>obj</a:t>
-            </a:r>
-            <a:r>
-              <a:rPr lang="en-US" dirty="0" smtClean="0"/>
-              <a:t>)</a:t>
-            </a:r>
-          </a:p>
-          <a:p>
-            <a:pPr marL="0" indent="0">
-              <a:buNone/>
-            </a:pPr>
-            <a:r>
-              <a:rPr lang="en-US" dirty="0" err="1" smtClean="0"/>
-              <a:t>def</a:t>
-            </a:r>
-            <a:r>
-              <a:rPr lang="en-US" dirty="0" smtClean="0"/>
-              <a:t> dump(</a:t>
-            </a:r>
-            <a:r>
-              <a:rPr lang="en-US" dirty="0" err="1" smtClean="0"/>
-              <a:t>obj</a:t>
-            </a:r>
-            <a:r>
-              <a:rPr lang="en-US" dirty="0" smtClean="0"/>
-              <a:t>):</a:t>
-            </a:r>
-          </a:p>
-          <a:p>
-            <a:pPr marL="0" indent="0">
-              <a:buNone/>
-            </a:pPr>
-            <a:r>
-              <a:rPr lang="en-US" dirty="0" smtClean="0"/>
-              <a:t>	for </a:t>
-            </a:r>
-            <a:r>
-              <a:rPr lang="en-US" dirty="0" err="1" smtClean="0"/>
-              <a:t>attr</a:t>
-            </a:r>
-            <a:r>
-              <a:rPr lang="en-US" dirty="0" smtClean="0"/>
-              <a:t> in </a:t>
-            </a:r>
-            <a:r>
-              <a:rPr lang="en-US" dirty="0" err="1" smtClean="0"/>
-              <a:t>dir</a:t>
-            </a:r>
-            <a:r>
-              <a:rPr lang="en-US" dirty="0" smtClean="0"/>
-              <a:t>(</a:t>
-            </a:r>
-            <a:r>
-              <a:rPr lang="en-US" dirty="0" err="1" smtClean="0"/>
-              <a:t>obj</a:t>
-            </a:r>
-            <a:r>
-              <a:rPr lang="en-US" dirty="0" smtClean="0"/>
-              <a:t>):</a:t>
-            </a:r>
-            <a:br>
-              <a:rPr lang="en-US" dirty="0" smtClean="0"/>
-            </a:br>
-            <a:r>
-              <a:rPr lang="en-US" dirty="0" smtClean="0"/>
-              <a:t>		print(‘obj.{} = {}’.format(</a:t>
-            </a:r>
-            <a:r>
-              <a:rPr lang="en-US" dirty="0" err="1" smtClean="0"/>
-              <a:t>attr</a:t>
-            </a:r>
-            <a:r>
-              <a:rPr lang="en-US" dirty="0" smtClean="0"/>
-              <a:t>, </a:t>
-            </a:r>
-            <a:r>
-              <a:rPr lang="en-US" dirty="0" err="1" smtClean="0"/>
-              <a:t>getattr</a:t>
-            </a:r>
-            <a:r>
-              <a:rPr lang="en-US" dirty="0" smtClean="0"/>
-              <a:t>(</a:t>
-            </a:r>
-            <a:r>
-              <a:rPr lang="en-US" dirty="0" err="1" smtClean="0"/>
-              <a:t>obj</a:t>
-            </a:r>
-            <a:r>
-              <a:rPr lang="en-US" dirty="0" smtClean="0"/>
-              <a:t>, </a:t>
-            </a:r>
-            <a:r>
-              <a:rPr lang="en-US" dirty="0" err="1" smtClean="0"/>
-              <a:t>attr</a:t>
-            </a:r>
-            <a:r>
-              <a:rPr lang="en-US" dirty="0" smtClean="0"/>
-              <a:t>)))</a:t>
-            </a:r>
-            <a:endParaRPr lang="en-US" dirty="0"/>
-          </a:p>
-          <a:p>
-            <a:pPr marL="0" indent="0">
-              <a:buNone/>
-            </a:pPr>
-            <a:r>
-              <a:rPr lang="en-US" dirty="0"/>
-              <a:t>d</a:t>
-            </a:r>
-            <a:r>
-              <a:rPr lang="en-US" dirty="0" smtClean="0"/>
-              <a:t>ump(</a:t>
-            </a:r>
-            <a:r>
-              <a:rPr lang="en-US" dirty="0" err="1" smtClean="0"/>
-              <a:t>obj</a:t>
-            </a:r>
-            <a:r>
-              <a:rPr lang="en-US" dirty="0" smtClean="0"/>
-              <a:t>)</a:t>
-            </a:r>
-          </a:p>
-          <a:p>
-            <a:pPr marL="0" indent="0">
-              <a:buNone/>
-            </a:pPr>
-            <a:r>
-              <a:rPr lang="en-US" dirty="0" smtClean="0"/>
-              <a:t>print(</a:t>
-            </a:r>
-            <a:r>
-              <a:rPr lang="en-US" dirty="0" err="1" smtClean="0"/>
-              <a:t>obj</a:t>
-            </a:r>
-            <a:r>
-              <a:rPr lang="en-US" dirty="0" smtClean="0"/>
-              <a:t>.__doc__)</a:t>
-            </a:r>
+          <a:bodyPr/>
+          <a:lstStyle/>
+          <a:p>
+            <a:r>
+              <a:rPr lang="en-US" dirty="0" smtClean="0"/>
+              <a:t>Types</a:t>
+            </a:r>
+          </a:p>
+          <a:p>
+            <a:r>
+              <a:rPr lang="en-US" dirty="0" smtClean="0"/>
+              <a:t>Assignment</a:t>
+            </a:r>
+          </a:p>
+          <a:p>
+            <a:r>
+              <a:rPr lang="en-US" dirty="0" smtClean="0"/>
+              <a:t>List manipulation</a:t>
+            </a:r>
+            <a:endParaRPr lang="en-US" dirty="0"/>
           </a:p>
         </p:txBody>
       </p:sp>
     </p:spTree>
     <p:extLst>
       <p:ext uri="{BB962C8B-B14F-4D97-AF65-F5344CB8AC3E}">
-        <p14:creationId xmlns:p14="http://schemas.microsoft.com/office/powerpoint/2010/main" val="113168731"/>
+        <p14:creationId xmlns:p14="http://schemas.microsoft.com/office/powerpoint/2010/main" val="890111720"/>
       </p:ext>
     </p:extLst>
   </p:cSld>
@@ -6872,15 +6736,14 @@
           <a:p>
             <a:r>
               <a:rPr lang="en-US" dirty="0" smtClean="0"/>
-              <a:t>Interactive </a:t>
-            </a:r>
-            <a:r>
-              <a:rPr lang="en-US" dirty="0" err="1" smtClean="0"/>
-              <a:t>Demnstration</a:t>
-            </a:r>
-            <a:r>
-              <a:rPr lang="en-US" dirty="0" smtClean="0"/>
-              <a:t>	</a:t>
+              <a:t>Day 2:</a:t>
+            </a:r>
+            <a:br>
+              <a:rPr lang="en-US" dirty="0" smtClean="0"/>
+            </a:br>
+            <a:r>
+              <a:rPr lang="en-US" dirty="0" smtClean="0"/>
+              <a:t>Program flow</a:t>
             </a:r>
             <a:endParaRPr lang="en-US" dirty="0"/>
           </a:p>
@@ -6898,25 +6761,106 @@
         </p:nvSpPr>
         <p:spPr/>
         <p:txBody>
-          <a:bodyPr/>
-          <a:lstStyle/>
-          <a:p>
-            <a:r>
-              <a:rPr lang="en-US" dirty="0" smtClean="0"/>
-              <a:t>Types</a:t>
-            </a:r>
-          </a:p>
-          <a:p>
-            <a:r>
-              <a:rPr lang="en-US" dirty="0" smtClean="0"/>
-              <a:t>Assignment</a:t>
-            </a:r>
-          </a:p>
-          <a:p>
-            <a:r>
-              <a:rPr lang="en-US" dirty="0" smtClean="0"/>
-              <a:t>List manipulation</a:t>
-            </a:r>
+          <a:bodyPr>
+            <a:normAutofit fontScale="92500" lnSpcReduction="20000"/>
+          </a:bodyPr>
+          <a:lstStyle/>
+          <a:p>
+            <a:r>
+              <a:rPr lang="en-US" dirty="0" smtClean="0"/>
+              <a:t>If </a:t>
+            </a:r>
+            <a:r>
+              <a:rPr lang="en-US" dirty="0" smtClean="0"/>
+              <a:t>Statement</a:t>
+            </a:r>
+          </a:p>
+          <a:p>
+            <a:r>
+              <a:rPr lang="en-US" dirty="0" smtClean="0"/>
+              <a:t>For Statement</a:t>
+            </a:r>
+          </a:p>
+          <a:p>
+            <a:r>
+              <a:rPr lang="en-US" dirty="0" smtClean="0"/>
+              <a:t>While </a:t>
+            </a:r>
+            <a:r>
+              <a:rPr lang="en-US" dirty="0" smtClean="0"/>
+              <a:t>Statement</a:t>
+            </a:r>
+          </a:p>
+          <a:p>
+            <a:r>
+              <a:rPr lang="en-US" dirty="0" smtClean="0"/>
+              <a:t>Procedures</a:t>
+            </a:r>
+          </a:p>
+          <a:p>
+            <a:pPr lvl="1"/>
+            <a:r>
+              <a:rPr lang="en-US" smtClean="0"/>
+              <a:t>Parameters </a:t>
+            </a:r>
+            <a:endParaRPr lang="en-US" dirty="0" smtClean="0"/>
+          </a:p>
+          <a:p>
+            <a:r>
+              <a:rPr lang="en-US" dirty="0" smtClean="0"/>
+              <a:t>Object Oriented Programming</a:t>
+            </a:r>
+          </a:p>
+          <a:p>
+            <a:r>
+              <a:rPr lang="en-US" dirty="0" smtClean="0"/>
+              <a:t>Print formatting</a:t>
+            </a:r>
+          </a:p>
+          <a:p>
+            <a:pPr lvl="1"/>
+            <a:r>
+              <a:rPr lang="en-US" dirty="0" smtClean="0"/>
+              <a:t>Python 2.7</a:t>
+            </a:r>
+          </a:p>
+          <a:p>
+            <a:pPr lvl="1"/>
+            <a:r>
+              <a:rPr lang="en-US" dirty="0" smtClean="0"/>
+              <a:t>Python 3.5+</a:t>
+            </a:r>
+          </a:p>
+          <a:p>
+            <a:r>
+              <a:rPr lang="en-US" dirty="0" smtClean="0"/>
+              <a:t>Installing Packages</a:t>
+            </a:r>
+          </a:p>
+          <a:p>
+            <a:pPr lvl="1"/>
+            <a:r>
+              <a:rPr lang="en-US" dirty="0" smtClean="0"/>
+              <a:t>Attached to </a:t>
+            </a:r>
+            <a:r>
+              <a:rPr lang="en-US" dirty="0"/>
+              <a:t>P</a:t>
+            </a:r>
+            <a:r>
+              <a:rPr lang="en-US" dirty="0" smtClean="0"/>
+              <a:t>ublic Internet</a:t>
+            </a:r>
+          </a:p>
+          <a:p>
+            <a:pPr lvl="1"/>
+            <a:r>
+              <a:rPr lang="en-US" dirty="0" smtClean="0"/>
+              <a:t>Attached to Private LAN</a:t>
+            </a:r>
+            <a:endParaRPr lang="en-US" dirty="0" smtClean="0"/>
+          </a:p>
+          <a:p>
             <a:endParaRPr lang="en-US" dirty="0"/>
           </a:p>
         </p:txBody>
@@ -6924,7 +6868,7 @@
     </p:spTree>
     <p:extLst>
       <p:ext uri="{BB962C8B-B14F-4D97-AF65-F5344CB8AC3E}">
-        <p14:creationId xmlns:p14="http://schemas.microsoft.com/office/powerpoint/2010/main" val="890111720"/>
+        <p14:creationId xmlns:p14="http://schemas.microsoft.com/office/powerpoint/2010/main" val="2421103895"/>
       </p:ext>
     </p:extLst>
   </p:cSld>
@@ -6968,939 +6912,6 @@
           <a:p>
             <a:r>
               <a:rPr lang="en-US" dirty="0" smtClean="0"/>
-              <a:t>Day 2:</a:t>
-            </a:r>
-            <a:br>
-              <a:rPr lang="en-US" dirty="0" smtClean="0"/>
-            </a:br>
-            <a:r>
-              <a:rPr lang="en-US" dirty="0" smtClean="0"/>
-              <a:t>Program flow</a:t>
-            </a:r>
-            <a:endParaRPr lang="en-US" dirty="0"/>
-          </a:p>
-        </p:txBody>
-      </p:sp>
-      <p:sp>
-        <p:nvSpPr>
-          <p:cNvPr id="3" name="Content Placeholder 2"/>
-          <p:cNvSpPr>
-            <a:spLocks noGrp="1"/>
-          </p:cNvSpPr>
-          <p:nvPr>
-            <p:ph idx="1"/>
-          </p:nvPr>
-        </p:nvSpPr>
-        <p:spPr/>
-        <p:txBody>
-          <a:bodyPr>
-            <a:normAutofit/>
-          </a:bodyPr>
-          <a:lstStyle/>
-          <a:p>
-            <a:r>
-              <a:rPr lang="en-US" dirty="0" smtClean="0"/>
-              <a:t>If Statement</a:t>
-            </a:r>
-          </a:p>
-          <a:p>
-            <a:r>
-              <a:rPr lang="en-US" dirty="0" smtClean="0"/>
-              <a:t>For Statement</a:t>
-            </a:r>
-          </a:p>
-          <a:p>
-            <a:r>
-              <a:rPr lang="en-US" dirty="0" smtClean="0"/>
-              <a:t>While Statement</a:t>
-            </a:r>
-          </a:p>
-          <a:p>
-            <a:r>
-              <a:rPr lang="en-US" dirty="0" smtClean="0"/>
-              <a:t>Class Definition</a:t>
-            </a:r>
-          </a:p>
-          <a:p>
-            <a:pPr lvl="1"/>
-            <a:r>
-              <a:rPr lang="en-US" dirty="0" smtClean="0"/>
-              <a:t>Instantiation</a:t>
-            </a:r>
-          </a:p>
-          <a:p>
-            <a:r>
-              <a:rPr lang="en-US" dirty="0" smtClean="0"/>
-              <a:t>Functions</a:t>
-            </a:r>
-          </a:p>
-          <a:p>
-            <a:pPr lvl="1"/>
-            <a:endParaRPr lang="en-US" dirty="0" smtClean="0"/>
-          </a:p>
-          <a:p>
-            <a:endParaRPr lang="en-US" dirty="0"/>
-          </a:p>
-        </p:txBody>
-      </p:sp>
-    </p:spTree>
-    <p:extLst>
-      <p:ext uri="{BB962C8B-B14F-4D97-AF65-F5344CB8AC3E}">
-        <p14:creationId xmlns:p14="http://schemas.microsoft.com/office/powerpoint/2010/main" val="2421103895"/>
-      </p:ext>
-    </p:extLst>
-  </p:cSld>
-  <p:clrMapOvr>
-    <a:masterClrMapping/>
-  </p:clrMapOvr>
-</p:sld>
-</file>
-
-<file path=ppt/slides/slide16.xml><?xml version="1.0" encoding="utf-8"?>
-<p:sld xmlns:a="http://schemas.openxmlformats.org/drawingml/2006/main" xmlns:r="http://schemas.openxmlformats.org/officeDocument/2006/relationships" xmlns:p="http://schemas.openxmlformats.org/presentationml/2006/main">
-  <p:cSld>
-    <p:spTree>
-      <p:nvGrpSpPr>
-        <p:cNvPr id="1" name=""/>
-        <p:cNvGrpSpPr/>
-        <p:nvPr/>
-      </p:nvGrpSpPr>
-      <p:grpSpPr>
-        <a:xfrm>
-          <a:off x="0" y="0"/>
-          <a:ext cx="0" cy="0"/>
-          <a:chOff x="0" y="0"/>
-          <a:chExt cx="0" cy="0"/>
-        </a:xfrm>
-      </p:grpSpPr>
-      <p:sp>
-        <p:nvSpPr>
-          <p:cNvPr id="2" name="Title 1"/>
-          <p:cNvSpPr>
-            <a:spLocks noGrp="1"/>
-          </p:cNvSpPr>
-          <p:nvPr>
-            <p:ph type="title"/>
-          </p:nvPr>
-        </p:nvSpPr>
-        <p:spPr/>
-        <p:txBody>
-          <a:bodyPr/>
-          <a:lstStyle/>
-          <a:p>
-            <a:r>
-              <a:rPr lang="en-US" dirty="0" smtClean="0"/>
-              <a:t>“if” statement</a:t>
-            </a:r>
-            <a:endParaRPr lang="en-US" dirty="0"/>
-          </a:p>
-        </p:txBody>
-      </p:sp>
-      <p:sp>
-        <p:nvSpPr>
-          <p:cNvPr id="3" name="Content Placeholder 2"/>
-          <p:cNvSpPr>
-            <a:spLocks noGrp="1"/>
-          </p:cNvSpPr>
-          <p:nvPr>
-            <p:ph idx="1"/>
-          </p:nvPr>
-        </p:nvSpPr>
-        <p:spPr/>
-        <p:txBody>
-          <a:bodyPr/>
-          <a:lstStyle/>
-          <a:p>
-            <a:r>
-              <a:rPr lang="en-US" dirty="0" smtClean="0"/>
-              <a:t>Will execute a block of code if the “expression” evaluates to “True”</a:t>
-            </a:r>
-          </a:p>
-          <a:p>
-            <a:pPr lvl="1"/>
-            <a:r>
-              <a:rPr lang="en-US" dirty="0" smtClean="0"/>
-              <a:t>Must be complete on a single line</a:t>
-            </a:r>
-          </a:p>
-          <a:p>
-            <a:r>
-              <a:rPr lang="en-US" dirty="0" smtClean="0"/>
-              <a:t>Has a typical and a non-typical else clause</a:t>
-            </a:r>
-          </a:p>
-          <a:p>
-            <a:pPr lvl="1"/>
-            <a:r>
-              <a:rPr lang="en-US" dirty="0" smtClean="0"/>
-              <a:t>“else:” the typical do the next block of code if the main “if” expression did not evaluate to “True”</a:t>
-            </a:r>
-          </a:p>
-          <a:p>
-            <a:pPr lvl="1"/>
-            <a:r>
-              <a:rPr lang="en-US" dirty="0" smtClean="0"/>
-              <a:t>“</a:t>
-            </a:r>
-            <a:r>
-              <a:rPr lang="en-US" dirty="0" err="1" smtClean="0"/>
-              <a:t>elif</a:t>
-            </a:r>
-            <a:r>
-              <a:rPr lang="en-US" dirty="0" smtClean="0"/>
-              <a:t>:” is the equivalent of “else: if” </a:t>
-            </a:r>
-          </a:p>
-          <a:p>
-            <a:pPr lvl="2"/>
-            <a:r>
-              <a:rPr lang="en-US" dirty="0" smtClean="0"/>
-              <a:t>Is used when trying to reduce unnecessary indentation making code more readable</a:t>
-            </a:r>
-          </a:p>
-          <a:p>
-            <a:r>
-              <a:rPr lang="en-US" dirty="0" smtClean="0"/>
-              <a:t>Each code block has a unique scope for objects first used in it</a:t>
-            </a:r>
-          </a:p>
-          <a:p>
-            <a:pPr marL="457200" lvl="1" indent="0">
-              <a:buNone/>
-            </a:pPr>
-            <a:endParaRPr lang="en-US" dirty="0" smtClean="0"/>
-          </a:p>
-        </p:txBody>
-      </p:sp>
-    </p:spTree>
-    <p:extLst>
-      <p:ext uri="{BB962C8B-B14F-4D97-AF65-F5344CB8AC3E}">
-        <p14:creationId xmlns:p14="http://schemas.microsoft.com/office/powerpoint/2010/main" val="89689128"/>
-      </p:ext>
-    </p:extLst>
-  </p:cSld>
-  <p:clrMapOvr>
-    <a:masterClrMapping/>
-  </p:clrMapOvr>
-</p:sld>
-</file>
-
-<file path=ppt/slides/slide17.xml><?xml version="1.0" encoding="utf-8"?>
-<p:sld xmlns:a="http://schemas.openxmlformats.org/drawingml/2006/main" xmlns:r="http://schemas.openxmlformats.org/officeDocument/2006/relationships" xmlns:p="http://schemas.openxmlformats.org/presentationml/2006/main">
-  <p:cSld>
-    <p:spTree>
-      <p:nvGrpSpPr>
-        <p:cNvPr id="1" name=""/>
-        <p:cNvGrpSpPr/>
-        <p:nvPr/>
-      </p:nvGrpSpPr>
-      <p:grpSpPr>
-        <a:xfrm>
-          <a:off x="0" y="0"/>
-          <a:ext cx="0" cy="0"/>
-          <a:chOff x="0" y="0"/>
-          <a:chExt cx="0" cy="0"/>
-        </a:xfrm>
-      </p:grpSpPr>
-      <p:sp>
-        <p:nvSpPr>
-          <p:cNvPr id="2" name="Title 1"/>
-          <p:cNvSpPr>
-            <a:spLocks noGrp="1"/>
-          </p:cNvSpPr>
-          <p:nvPr>
-            <p:ph type="title"/>
-          </p:nvPr>
-        </p:nvSpPr>
-        <p:spPr/>
-        <p:txBody>
-          <a:bodyPr/>
-          <a:lstStyle/>
-          <a:p>
-            <a:r>
-              <a:rPr lang="en-US" sz="2800" dirty="0" smtClean="0"/>
-              <a:t>The “if” – “</a:t>
-            </a:r>
-            <a:r>
-              <a:rPr lang="en-US" sz="2800" dirty="0" err="1" smtClean="0"/>
-              <a:t>elif</a:t>
-            </a:r>
-            <a:r>
-              <a:rPr lang="en-US" sz="2800" dirty="0" smtClean="0"/>
-              <a:t>” – “else”  combination can be used to replace the “C/C</a:t>
-            </a:r>
-            <a:r>
-              <a:rPr lang="en-US" sz="2800" smtClean="0"/>
-              <a:t>++/Java” </a:t>
-            </a:r>
-            <a:r>
-              <a:rPr lang="en-US" sz="2800" dirty="0" smtClean="0"/>
-              <a:t>“switch” statement</a:t>
-            </a:r>
-            <a:endParaRPr lang="en-US" sz="2800" dirty="0"/>
-          </a:p>
-        </p:txBody>
-      </p:sp>
-      <p:sp>
-        <p:nvSpPr>
-          <p:cNvPr id="3" name="Content Placeholder 2"/>
-          <p:cNvSpPr>
-            <a:spLocks noGrp="1"/>
-          </p:cNvSpPr>
-          <p:nvPr>
-            <p:ph idx="1"/>
-          </p:nvPr>
-        </p:nvSpPr>
-        <p:spPr>
-          <a:xfrm>
-            <a:off x="1103312" y="2052918"/>
-            <a:ext cx="3756555" cy="4195481"/>
-          </a:xfrm>
-        </p:spPr>
-        <p:txBody>
-          <a:bodyPr/>
-          <a:lstStyle/>
-          <a:p>
-            <a:pPr marL="0" indent="0">
-              <a:buNone/>
-            </a:pPr>
-            <a:r>
-              <a:rPr lang="en-US" dirty="0" smtClean="0"/>
-              <a:t>if expression :</a:t>
-            </a:r>
-            <a:br>
-              <a:rPr lang="en-US" dirty="0" smtClean="0"/>
-            </a:br>
-            <a:r>
-              <a:rPr lang="en-US" dirty="0" smtClean="0"/>
-              <a:t>	code block</a:t>
-            </a:r>
-            <a:r>
-              <a:rPr lang="en-US" dirty="0"/>
-              <a:t/>
-            </a:r>
-            <a:br>
-              <a:rPr lang="en-US" dirty="0"/>
-            </a:br>
-            <a:r>
-              <a:rPr lang="en-US" dirty="0" err="1" smtClean="0"/>
-              <a:t>elif</a:t>
-            </a:r>
-            <a:r>
-              <a:rPr lang="en-US" dirty="0" smtClean="0"/>
-              <a:t> expression:</a:t>
-            </a:r>
-            <a:r>
-              <a:rPr lang="en-US" dirty="0"/>
-              <a:t/>
-            </a:r>
-            <a:br>
-              <a:rPr lang="en-US" dirty="0"/>
-            </a:br>
-            <a:r>
-              <a:rPr lang="en-US" dirty="0" smtClean="0"/>
-              <a:t>	code block</a:t>
-            </a:r>
-            <a:r>
-              <a:rPr lang="en-US" dirty="0"/>
-              <a:t/>
-            </a:r>
-            <a:br>
-              <a:rPr lang="en-US" dirty="0"/>
-            </a:br>
-            <a:r>
-              <a:rPr lang="en-US" dirty="0" err="1" smtClean="0"/>
-              <a:t>elif</a:t>
-            </a:r>
-            <a:r>
-              <a:rPr lang="en-US" dirty="0" smtClean="0"/>
-              <a:t> expression:</a:t>
-            </a:r>
-            <a:r>
-              <a:rPr lang="en-US" dirty="0"/>
-              <a:t/>
-            </a:r>
-            <a:br>
-              <a:rPr lang="en-US" dirty="0"/>
-            </a:br>
-            <a:r>
-              <a:rPr lang="en-US" dirty="0" smtClean="0"/>
-              <a:t>	code block</a:t>
-            </a:r>
-            <a:r>
-              <a:rPr lang="en-US" dirty="0"/>
-              <a:t/>
-            </a:r>
-            <a:br>
-              <a:rPr lang="en-US" dirty="0"/>
-            </a:br>
-            <a:r>
-              <a:rPr lang="en-US" dirty="0" smtClean="0"/>
-              <a:t>else:</a:t>
-            </a:r>
-            <a:r>
-              <a:rPr lang="en-US" dirty="0"/>
-              <a:t/>
-            </a:r>
-            <a:br>
-              <a:rPr lang="en-US" dirty="0"/>
-            </a:br>
-            <a:r>
-              <a:rPr lang="en-US" dirty="0" smtClean="0"/>
-              <a:t>	code block</a:t>
-            </a:r>
-          </a:p>
-        </p:txBody>
-      </p:sp>
-      <p:sp>
-        <p:nvSpPr>
-          <p:cNvPr id="4" name="Content Placeholder 2"/>
-          <p:cNvSpPr txBox="1">
-            <a:spLocks/>
-          </p:cNvSpPr>
-          <p:nvPr/>
-        </p:nvSpPr>
-        <p:spPr>
-          <a:xfrm>
-            <a:off x="5348472" y="2052918"/>
-            <a:ext cx="3756555" cy="4195481"/>
-          </a:xfrm>
-          <a:prstGeom prst="rect">
-            <a:avLst/>
-          </a:prstGeom>
-        </p:spPr>
-        <p:txBody>
-          <a:bodyPr vert="horz" lIns="91440" tIns="45720" rIns="91440" bIns="45720" rtlCol="0">
-            <a:normAutofit/>
-          </a:bodyPr>
-          <a:lstStyle>
-            <a:lvl1pPr marL="342900" indent="-342900" algn="l" defTabSz="457200" rtl="0" eaLnBrk="1" latinLnBrk="0" hangingPunct="1">
-              <a:spcBef>
-                <a:spcPts val="1000"/>
-              </a:spcBef>
-              <a:spcAft>
-                <a:spcPts val="0"/>
-              </a:spcAft>
-              <a:buClr>
-                <a:schemeClr val="accent1">
-                  <a:lumMod val="60000"/>
-                  <a:lumOff val="40000"/>
-                </a:schemeClr>
-              </a:buClr>
-              <a:buSzPct val="80000"/>
-              <a:buFont typeface="Wingdings 3" charset="2"/>
-              <a:buChar char=""/>
-              <a:defRPr sz="2000" b="0" i="0" kern="1200">
-                <a:solidFill>
-                  <a:schemeClr val="tx1"/>
-                </a:solidFill>
-                <a:latin typeface="+mj-lt"/>
-                <a:ea typeface="+mj-ea"/>
-                <a:cs typeface="+mj-cs"/>
-              </a:defRPr>
-            </a:lvl1pPr>
-            <a:lvl2pPr marL="742950" indent="-285750" algn="l" defTabSz="457200" rtl="0" eaLnBrk="1" latinLnBrk="0" hangingPunct="1">
-              <a:spcBef>
-                <a:spcPts val="1000"/>
-              </a:spcBef>
-              <a:spcAft>
-                <a:spcPts val="0"/>
-              </a:spcAft>
-              <a:buClr>
-                <a:schemeClr val="accent1">
-                  <a:lumMod val="60000"/>
-                  <a:lumOff val="40000"/>
-                </a:schemeClr>
-              </a:buClr>
-              <a:buSzPct val="80000"/>
-              <a:buFont typeface="Wingdings 3" charset="2"/>
-              <a:buChar char=""/>
-              <a:defRPr sz="1800" b="0" i="0" kern="1200">
-                <a:solidFill>
-                  <a:schemeClr val="tx1"/>
-                </a:solidFill>
-                <a:latin typeface="+mj-lt"/>
-                <a:ea typeface="+mj-ea"/>
-                <a:cs typeface="+mj-cs"/>
-              </a:defRPr>
-            </a:lvl2pPr>
-            <a:lvl3pPr marL="1143000" indent="-228600" algn="l" defTabSz="457200" rtl="0" eaLnBrk="1" latinLnBrk="0" hangingPunct="1">
-              <a:spcBef>
-                <a:spcPts val="1000"/>
-              </a:spcBef>
-              <a:spcAft>
-                <a:spcPts val="0"/>
-              </a:spcAft>
-              <a:buClr>
-                <a:schemeClr val="accent1">
-                  <a:lumMod val="60000"/>
-                  <a:lumOff val="40000"/>
-                </a:schemeClr>
-              </a:buClr>
-              <a:buSzPct val="80000"/>
-              <a:buFont typeface="Wingdings 3" charset="2"/>
-              <a:buChar char=""/>
-              <a:defRPr sz="1600" b="0" i="0" kern="1200">
-                <a:solidFill>
-                  <a:schemeClr val="tx1"/>
-                </a:solidFill>
-                <a:latin typeface="+mj-lt"/>
-                <a:ea typeface="+mj-ea"/>
-                <a:cs typeface="+mj-cs"/>
-              </a:defRPr>
-            </a:lvl3pPr>
-            <a:lvl4pPr marL="1600200" indent="-228600" algn="l" defTabSz="457200" rtl="0" eaLnBrk="1" latinLnBrk="0" hangingPunct="1">
-              <a:spcBef>
-                <a:spcPts val="1000"/>
-              </a:spcBef>
-              <a:spcAft>
-                <a:spcPts val="0"/>
-              </a:spcAft>
-              <a:buClr>
-                <a:schemeClr val="accent1">
-                  <a:lumMod val="60000"/>
-                  <a:lumOff val="40000"/>
-                </a:schemeClr>
-              </a:buClr>
-              <a:buSzPct val="80000"/>
-              <a:buFont typeface="Wingdings 3" charset="2"/>
-              <a:buChar char=""/>
-              <a:defRPr sz="1400" b="0" i="0" kern="1200">
-                <a:solidFill>
-                  <a:schemeClr val="tx1"/>
-                </a:solidFill>
-                <a:latin typeface="+mj-lt"/>
-                <a:ea typeface="+mj-ea"/>
-                <a:cs typeface="+mj-cs"/>
-              </a:defRPr>
-            </a:lvl4pPr>
-            <a:lvl5pPr marL="2057400" indent="-228600" algn="l" defTabSz="457200" rtl="0" eaLnBrk="1" latinLnBrk="0" hangingPunct="1">
-              <a:spcBef>
-                <a:spcPts val="1000"/>
-              </a:spcBef>
-              <a:spcAft>
-                <a:spcPts val="0"/>
-              </a:spcAft>
-              <a:buClr>
-                <a:schemeClr val="accent1">
-                  <a:lumMod val="60000"/>
-                  <a:lumOff val="40000"/>
-                </a:schemeClr>
-              </a:buClr>
-              <a:buSzPct val="80000"/>
-              <a:buFont typeface="Wingdings 3" charset="2"/>
-              <a:buChar char=""/>
-              <a:defRPr sz="1400" b="0" i="0" kern="1200">
-                <a:solidFill>
-                  <a:schemeClr val="tx1"/>
-                </a:solidFill>
-                <a:latin typeface="+mj-lt"/>
-                <a:ea typeface="+mj-ea"/>
-                <a:cs typeface="+mj-cs"/>
-              </a:defRPr>
-            </a:lvl5pPr>
-            <a:lvl6pPr marL="2514600" indent="-228600" algn="l" defTabSz="457200" rtl="0" eaLnBrk="1" latinLnBrk="0" hangingPunct="1">
-              <a:spcBef>
-                <a:spcPts val="1000"/>
-              </a:spcBef>
-              <a:spcAft>
-                <a:spcPts val="0"/>
-              </a:spcAft>
-              <a:buClr>
-                <a:schemeClr val="accent1">
-                  <a:lumMod val="60000"/>
-                  <a:lumOff val="40000"/>
-                </a:schemeClr>
-              </a:buClr>
-              <a:buSzPct val="80000"/>
-              <a:buFont typeface="Wingdings 3" charset="2"/>
-              <a:buChar char=""/>
-              <a:defRPr sz="1400" b="0" i="0" kern="1200">
-                <a:solidFill>
-                  <a:schemeClr val="tx1"/>
-                </a:solidFill>
-                <a:latin typeface="+mj-lt"/>
-                <a:ea typeface="+mj-ea"/>
-                <a:cs typeface="+mj-cs"/>
-              </a:defRPr>
-            </a:lvl6pPr>
-            <a:lvl7pPr marL="2971800" indent="-228600" algn="l" defTabSz="457200" rtl="0" eaLnBrk="1" latinLnBrk="0" hangingPunct="1">
-              <a:spcBef>
-                <a:spcPts val="1000"/>
-              </a:spcBef>
-              <a:spcAft>
-                <a:spcPts val="0"/>
-              </a:spcAft>
-              <a:buClr>
-                <a:schemeClr val="accent1">
-                  <a:lumMod val="60000"/>
-                  <a:lumOff val="40000"/>
-                </a:schemeClr>
-              </a:buClr>
-              <a:buSzPct val="80000"/>
-              <a:buFont typeface="Wingdings 3" charset="2"/>
-              <a:buChar char=""/>
-              <a:defRPr sz="1400" b="0" i="0" kern="1200">
-                <a:solidFill>
-                  <a:schemeClr val="tx1"/>
-                </a:solidFill>
-                <a:latin typeface="+mj-lt"/>
-                <a:ea typeface="+mj-ea"/>
-                <a:cs typeface="+mj-cs"/>
-              </a:defRPr>
-            </a:lvl7pPr>
-            <a:lvl8pPr marL="3429000" indent="-228600" algn="l" defTabSz="457200" rtl="0" eaLnBrk="1" latinLnBrk="0" hangingPunct="1">
-              <a:spcBef>
-                <a:spcPts val="1000"/>
-              </a:spcBef>
-              <a:spcAft>
-                <a:spcPts val="0"/>
-              </a:spcAft>
-              <a:buClr>
-                <a:schemeClr val="accent1">
-                  <a:lumMod val="60000"/>
-                  <a:lumOff val="40000"/>
-                </a:schemeClr>
-              </a:buClr>
-              <a:buSzPct val="80000"/>
-              <a:buFont typeface="Wingdings 3" charset="2"/>
-              <a:buChar char=""/>
-              <a:defRPr sz="1400" b="0" i="0" kern="1200">
-                <a:solidFill>
-                  <a:schemeClr val="tx1"/>
-                </a:solidFill>
-                <a:latin typeface="+mj-lt"/>
-                <a:ea typeface="+mj-ea"/>
-                <a:cs typeface="+mj-cs"/>
-              </a:defRPr>
-            </a:lvl8pPr>
-            <a:lvl9pPr marL="3886200" indent="-228600" algn="l" defTabSz="457200" rtl="0" eaLnBrk="1" latinLnBrk="0" hangingPunct="1">
-              <a:spcBef>
-                <a:spcPts val="1000"/>
-              </a:spcBef>
-              <a:spcAft>
-                <a:spcPts val="0"/>
-              </a:spcAft>
-              <a:buClr>
-                <a:schemeClr val="accent1">
-                  <a:lumMod val="60000"/>
-                  <a:lumOff val="40000"/>
-                </a:schemeClr>
-              </a:buClr>
-              <a:buSzPct val="80000"/>
-              <a:buFont typeface="Wingdings 3" charset="2"/>
-              <a:buChar char=""/>
-              <a:defRPr sz="1400" b="0" i="0" kern="1200">
-                <a:solidFill>
-                  <a:schemeClr val="tx1"/>
-                </a:solidFill>
-                <a:latin typeface="+mj-lt"/>
-                <a:ea typeface="+mj-ea"/>
-                <a:cs typeface="+mj-cs"/>
-              </a:defRPr>
-            </a:lvl9pPr>
-          </a:lstStyle>
-          <a:p>
-            <a:pPr marL="0" indent="0">
-              <a:buFont typeface="Wingdings 3" charset="2"/>
-              <a:buNone/>
-            </a:pPr>
-            <a:r>
-              <a:rPr lang="en-US" dirty="0" smtClean="0"/>
-              <a:t>switch (expression) {</a:t>
-            </a:r>
-            <a:br>
-              <a:rPr lang="en-US" dirty="0" smtClean="0"/>
-            </a:br>
-            <a:r>
-              <a:rPr lang="en-US" dirty="0" smtClean="0"/>
-              <a:t>case a:</a:t>
-            </a:r>
-            <a:br>
-              <a:rPr lang="en-US" dirty="0" smtClean="0"/>
-            </a:br>
-            <a:r>
-              <a:rPr lang="en-US" dirty="0" smtClean="0"/>
-              <a:t>	code block;</a:t>
-            </a:r>
-            <a:br>
-              <a:rPr lang="en-US" dirty="0" smtClean="0"/>
-            </a:br>
-            <a:r>
-              <a:rPr lang="en-US" dirty="0" smtClean="0"/>
-              <a:t>	break;</a:t>
-            </a:r>
-            <a:br>
-              <a:rPr lang="en-US" dirty="0" smtClean="0"/>
-            </a:br>
-            <a:r>
-              <a:rPr lang="en-US" dirty="0" smtClean="0"/>
-              <a:t>case b:</a:t>
-            </a:r>
-            <a:br>
-              <a:rPr lang="en-US" dirty="0" smtClean="0"/>
-            </a:br>
-            <a:r>
-              <a:rPr lang="en-US" dirty="0" smtClean="0"/>
-              <a:t>	code block;</a:t>
-            </a:r>
-            <a:br>
-              <a:rPr lang="en-US" dirty="0" smtClean="0"/>
-            </a:br>
-            <a:r>
-              <a:rPr lang="en-US" dirty="0" smtClean="0"/>
-              <a:t>	break;</a:t>
-            </a:r>
-            <a:br>
-              <a:rPr lang="en-US" dirty="0" smtClean="0"/>
-            </a:br>
-            <a:r>
-              <a:rPr lang="en-US" dirty="0" smtClean="0"/>
-              <a:t>case c:</a:t>
-            </a:r>
-            <a:br>
-              <a:rPr lang="en-US" dirty="0" smtClean="0"/>
-            </a:br>
-            <a:r>
-              <a:rPr lang="en-US" dirty="0" smtClean="0"/>
-              <a:t>	code block;</a:t>
-            </a:r>
-            <a:br>
-              <a:rPr lang="en-US" dirty="0" smtClean="0"/>
-            </a:br>
-            <a:r>
-              <a:rPr lang="en-US" dirty="0" smtClean="0"/>
-              <a:t>      break;</a:t>
-            </a:r>
-            <a:br>
-              <a:rPr lang="en-US" dirty="0" smtClean="0"/>
-            </a:br>
-            <a:r>
-              <a:rPr lang="en-US" dirty="0" smtClean="0"/>
-              <a:t>default:</a:t>
-            </a:r>
-            <a:br>
-              <a:rPr lang="en-US" dirty="0" smtClean="0"/>
-            </a:br>
-            <a:r>
-              <a:rPr lang="en-US" dirty="0" smtClean="0"/>
-              <a:t>	code block;</a:t>
-            </a:r>
-            <a:br>
-              <a:rPr lang="en-US" dirty="0" smtClean="0"/>
-            </a:br>
-            <a:r>
-              <a:rPr lang="en-US" dirty="0" smtClean="0"/>
-              <a:t>}</a:t>
-            </a:r>
-          </a:p>
-        </p:txBody>
-      </p:sp>
-    </p:spTree>
-    <p:extLst>
-      <p:ext uri="{BB962C8B-B14F-4D97-AF65-F5344CB8AC3E}">
-        <p14:creationId xmlns:p14="http://schemas.microsoft.com/office/powerpoint/2010/main" val="729859071"/>
-      </p:ext>
-    </p:extLst>
-  </p:cSld>
-  <p:clrMapOvr>
-    <a:masterClrMapping/>
-  </p:clrMapOvr>
-</p:sld>
-</file>
-
-<file path=ppt/slides/slide18.xml><?xml version="1.0" encoding="utf-8"?>
-<p:sld xmlns:a="http://schemas.openxmlformats.org/drawingml/2006/main" xmlns:r="http://schemas.openxmlformats.org/officeDocument/2006/relationships" xmlns:p="http://schemas.openxmlformats.org/presentationml/2006/main">
-  <p:cSld>
-    <p:spTree>
-      <p:nvGrpSpPr>
-        <p:cNvPr id="1" name=""/>
-        <p:cNvGrpSpPr/>
-        <p:nvPr/>
-      </p:nvGrpSpPr>
-      <p:grpSpPr>
-        <a:xfrm>
-          <a:off x="0" y="0"/>
-          <a:ext cx="0" cy="0"/>
-          <a:chOff x="0" y="0"/>
-          <a:chExt cx="0" cy="0"/>
-        </a:xfrm>
-      </p:grpSpPr>
-      <p:sp>
-        <p:nvSpPr>
-          <p:cNvPr id="2" name="Title 1"/>
-          <p:cNvSpPr>
-            <a:spLocks noGrp="1"/>
-          </p:cNvSpPr>
-          <p:nvPr>
-            <p:ph type="title"/>
-          </p:nvPr>
-        </p:nvSpPr>
-        <p:spPr/>
-        <p:txBody>
-          <a:bodyPr/>
-          <a:lstStyle/>
-          <a:p>
-            <a:r>
-              <a:rPr lang="en-US" dirty="0" smtClean="0"/>
-              <a:t>“for” statement</a:t>
-            </a:r>
-            <a:endParaRPr lang="en-US" dirty="0"/>
-          </a:p>
-        </p:txBody>
-      </p:sp>
-      <p:sp>
-        <p:nvSpPr>
-          <p:cNvPr id="3" name="Content Placeholder 2"/>
-          <p:cNvSpPr>
-            <a:spLocks noGrp="1"/>
-          </p:cNvSpPr>
-          <p:nvPr>
-            <p:ph idx="1"/>
-          </p:nvPr>
-        </p:nvSpPr>
-        <p:spPr/>
-        <p:txBody>
-          <a:bodyPr/>
-          <a:lstStyle/>
-          <a:p>
-            <a:r>
-              <a:rPr lang="en-US" dirty="0" smtClean="0"/>
-              <a:t>Used to traverse </a:t>
-            </a:r>
-            <a:r>
-              <a:rPr lang="en-US" dirty="0" err="1" smtClean="0"/>
-              <a:t>iterable</a:t>
-            </a:r>
-            <a:r>
-              <a:rPr lang="en-US" dirty="0" smtClean="0"/>
-              <a:t> objects</a:t>
-            </a:r>
-          </a:p>
-          <a:p>
-            <a:pPr lvl="1"/>
-            <a:r>
-              <a:rPr lang="en-US" dirty="0" smtClean="0"/>
-              <a:t>Python 2.7 – </a:t>
-            </a:r>
-            <a:r>
-              <a:rPr lang="en-US" dirty="0" err="1" smtClean="0"/>
-              <a:t>iterable</a:t>
-            </a:r>
-            <a:endParaRPr lang="en-US" dirty="0" smtClean="0"/>
-          </a:p>
-          <a:p>
-            <a:pPr lvl="1"/>
-            <a:r>
-              <a:rPr lang="en-US" dirty="0" smtClean="0"/>
-              <a:t>Python 3.x - </a:t>
-            </a:r>
-            <a:r>
-              <a:rPr lang="en-US" dirty="0" err="1" smtClean="0"/>
-              <a:t>iteritem</a:t>
-            </a:r>
-            <a:endParaRPr lang="en-US" dirty="0" smtClean="0"/>
-          </a:p>
-          <a:p>
-            <a:r>
-              <a:rPr lang="en-US" dirty="0" smtClean="0"/>
-              <a:t>Has unique syntax compared to other languages</a:t>
-            </a:r>
-          </a:p>
-          <a:p>
-            <a:pPr marL="457200" lvl="1" indent="0">
-              <a:buNone/>
-            </a:pPr>
-            <a:r>
-              <a:rPr lang="en-US" sz="1200" dirty="0" smtClean="0"/>
-              <a:t>for item in </a:t>
-            </a:r>
-            <a:r>
-              <a:rPr lang="en-US" sz="1200" dirty="0" err="1" smtClean="0"/>
-              <a:t>iterable_object</a:t>
-            </a:r>
-            <a:r>
-              <a:rPr lang="en-US" sz="1200" dirty="0" smtClean="0"/>
-              <a:t>:</a:t>
-            </a:r>
-            <a:br>
-              <a:rPr lang="en-US" sz="1200" dirty="0" smtClean="0"/>
-            </a:br>
-            <a:r>
-              <a:rPr lang="en-US" sz="1200" dirty="0" smtClean="0"/>
-              <a:t>	&lt;some python code&gt;</a:t>
-            </a:r>
-            <a:br>
-              <a:rPr lang="en-US" sz="1200" dirty="0" smtClean="0"/>
-            </a:br>
-            <a:r>
-              <a:rPr lang="en-US" sz="1200" dirty="0" smtClean="0"/>
-              <a:t>else:</a:t>
-            </a:r>
-            <a:br>
-              <a:rPr lang="en-US" sz="1200" dirty="0" smtClean="0"/>
-            </a:br>
-            <a:r>
-              <a:rPr lang="en-US" sz="1200" dirty="0" smtClean="0"/>
-              <a:t>	&lt;some python code that will only execute if the code did not “break” out of the loop&gt;</a:t>
-            </a:r>
-          </a:p>
-          <a:p>
-            <a:r>
-              <a:rPr lang="en-US" dirty="0" smtClean="0"/>
-              <a:t>Use creates a unique “scope” for variables first used in it.</a:t>
-            </a:r>
-            <a:endParaRPr lang="en-US" dirty="0"/>
-          </a:p>
-        </p:txBody>
-      </p:sp>
-    </p:spTree>
-    <p:extLst>
-      <p:ext uri="{BB962C8B-B14F-4D97-AF65-F5344CB8AC3E}">
-        <p14:creationId xmlns:p14="http://schemas.microsoft.com/office/powerpoint/2010/main" val="378336992"/>
-      </p:ext>
-    </p:extLst>
-  </p:cSld>
-  <p:clrMapOvr>
-    <a:masterClrMapping/>
-  </p:clrMapOvr>
-</p:sld>
-</file>
-
-<file path=ppt/slides/slide19.xml><?xml version="1.0" encoding="utf-8"?>
-<p:sld xmlns:a="http://schemas.openxmlformats.org/drawingml/2006/main" xmlns:r="http://schemas.openxmlformats.org/officeDocument/2006/relationships" xmlns:p="http://schemas.openxmlformats.org/presentationml/2006/main">
-  <p:cSld>
-    <p:spTree>
-      <p:nvGrpSpPr>
-        <p:cNvPr id="1" name=""/>
-        <p:cNvGrpSpPr/>
-        <p:nvPr/>
-      </p:nvGrpSpPr>
-      <p:grpSpPr>
-        <a:xfrm>
-          <a:off x="0" y="0"/>
-          <a:ext cx="0" cy="0"/>
-          <a:chOff x="0" y="0"/>
-          <a:chExt cx="0" cy="0"/>
-        </a:xfrm>
-      </p:grpSpPr>
-      <p:sp>
-        <p:nvSpPr>
-          <p:cNvPr id="2" name="Title 1"/>
-          <p:cNvSpPr>
-            <a:spLocks noGrp="1"/>
-          </p:cNvSpPr>
-          <p:nvPr>
-            <p:ph type="title"/>
-          </p:nvPr>
-        </p:nvSpPr>
-        <p:spPr/>
-        <p:txBody>
-          <a:bodyPr/>
-          <a:lstStyle/>
-          <a:p>
-            <a:r>
-              <a:rPr lang="en-US" dirty="0" smtClean="0"/>
               <a:t>Range function</a:t>
             </a:r>
             <a:endParaRPr lang="en-US" dirty="0"/>
@@ -7978,7 +6989,7 @@
             <a:pPr lvl="2"/>
             <a:r>
               <a:rPr lang="en-US" dirty="0" smtClean="0"/>
-              <a:t>Does not create a list only an output each time it is called</a:t>
+              <a:t>Does not create a list only a output each time it is called</a:t>
             </a:r>
             <a:endParaRPr lang="en-US" dirty="0"/>
           </a:p>
@@ -8091,7 +7102,7 @@
           <a:p>
             <a:r>
               <a:rPr lang="en-US" dirty="0" smtClean="0"/>
-              <a:t>Object oriented language - but you don’t have to create objects</a:t>
+              <a:t>Object oriented language - but you don’t have to use objects</a:t>
             </a:r>
           </a:p>
           <a:p>
@@ -8147,651 +7158,6 @@
       </p:par>
     </p:tnLst>
   </p:timing>
-</p:sld>
-</file>
-
-<file path=ppt/slides/slide20.xml><?xml version="1.0" encoding="utf-8"?>
-<p:sld xmlns:a="http://schemas.openxmlformats.org/drawingml/2006/main" xmlns:r="http://schemas.openxmlformats.org/officeDocument/2006/relationships" xmlns:p="http://schemas.openxmlformats.org/presentationml/2006/main">
-  <p:cSld>
-    <p:spTree>
-      <p:nvGrpSpPr>
-        <p:cNvPr id="1" name=""/>
-        <p:cNvGrpSpPr/>
-        <p:nvPr/>
-      </p:nvGrpSpPr>
-      <p:grpSpPr>
-        <a:xfrm>
-          <a:off x="0" y="0"/>
-          <a:ext cx="0" cy="0"/>
-          <a:chOff x="0" y="0"/>
-          <a:chExt cx="0" cy="0"/>
-        </a:xfrm>
-      </p:grpSpPr>
-      <p:sp>
-        <p:nvSpPr>
-          <p:cNvPr id="2" name="Title 1"/>
-          <p:cNvSpPr>
-            <a:spLocks noGrp="1"/>
-          </p:cNvSpPr>
-          <p:nvPr>
-            <p:ph type="title"/>
-          </p:nvPr>
-        </p:nvSpPr>
-        <p:spPr/>
-        <p:txBody>
-          <a:bodyPr/>
-          <a:lstStyle/>
-          <a:p>
-            <a:r>
-              <a:rPr lang="en-US" dirty="0" smtClean="0"/>
-              <a:t>List Comprehensions</a:t>
-            </a:r>
-            <a:endParaRPr lang="en-US" dirty="0"/>
-          </a:p>
-        </p:txBody>
-      </p:sp>
-      <p:sp>
-        <p:nvSpPr>
-          <p:cNvPr id="3" name="Content Placeholder 2"/>
-          <p:cNvSpPr>
-            <a:spLocks noGrp="1"/>
-          </p:cNvSpPr>
-          <p:nvPr>
-            <p:ph idx="1"/>
-          </p:nvPr>
-        </p:nvSpPr>
-        <p:spPr/>
-        <p:txBody>
-          <a:bodyPr/>
-          <a:lstStyle/>
-          <a:p>
-            <a:r>
-              <a:rPr lang="en-US" dirty="0" smtClean="0"/>
-              <a:t>Can reduce code by flattening a for loop</a:t>
-            </a:r>
-          </a:p>
-          <a:p>
-            <a:r>
-              <a:rPr lang="en-US" dirty="0" smtClean="0"/>
-              <a:t>Replaces:</a:t>
-            </a:r>
-          </a:p>
-          <a:p>
-            <a:pPr marL="457200" lvl="1" indent="0">
-              <a:buNone/>
-            </a:pPr>
-            <a:r>
-              <a:rPr lang="en-US" dirty="0" smtClean="0"/>
-              <a:t>l = []</a:t>
-            </a:r>
-          </a:p>
-          <a:p>
-            <a:pPr marL="457200" lvl="1" indent="0">
-              <a:buNone/>
-            </a:pPr>
-            <a:r>
-              <a:rPr lang="en-US" dirty="0"/>
-              <a:t>f</a:t>
-            </a:r>
-            <a:r>
-              <a:rPr lang="en-US" dirty="0" smtClean="0"/>
-              <a:t>or letter in ‘string’:</a:t>
-            </a:r>
-          </a:p>
-          <a:p>
-            <a:pPr marL="457200" lvl="1" indent="0">
-              <a:buNone/>
-            </a:pPr>
-            <a:r>
-              <a:rPr lang="en-US" dirty="0" smtClean="0"/>
-              <a:t>	</a:t>
-            </a:r>
-            <a:r>
-              <a:rPr lang="en-US" dirty="0" err="1" smtClean="0"/>
-              <a:t>l.append</a:t>
-            </a:r>
-            <a:r>
-              <a:rPr lang="en-US" dirty="0" smtClean="0"/>
-              <a:t>(letter)</a:t>
-            </a:r>
-            <a:endParaRPr lang="en-US" dirty="0"/>
-          </a:p>
-          <a:p>
-            <a:r>
-              <a:rPr lang="en-US" dirty="0" smtClean="0"/>
-              <a:t>With</a:t>
-            </a:r>
-          </a:p>
-          <a:p>
-            <a:pPr marL="0" indent="0">
-              <a:buNone/>
-            </a:pPr>
-            <a:r>
-              <a:rPr lang="en-US" dirty="0"/>
-              <a:t>	</a:t>
-            </a:r>
-            <a:r>
-              <a:rPr lang="en-US" dirty="0" smtClean="0"/>
-              <a:t>l = [letter for letter in ‘string’]</a:t>
-            </a:r>
-          </a:p>
-          <a:p>
-            <a:pPr marL="0" indent="0">
-              <a:buNone/>
-            </a:pPr>
-            <a:r>
-              <a:rPr lang="en-US" dirty="0" smtClean="0"/>
-              <a:t>	first = [x**2 for x in </a:t>
-            </a:r>
-            <a:r>
-              <a:rPr lang="en-US" dirty="0" err="1" smtClean="0"/>
-              <a:t>xrange</a:t>
-            </a:r>
-            <a:r>
-              <a:rPr lang="en-US" dirty="0" smtClean="0"/>
-              <a:t>(0,11)]</a:t>
-            </a:r>
-          </a:p>
-          <a:p>
-            <a:pPr marL="0" indent="0">
-              <a:buNone/>
-            </a:pPr>
-            <a:r>
-              <a:rPr lang="en-US" dirty="0"/>
-              <a:t>	</a:t>
-            </a:r>
-            <a:r>
-              <a:rPr lang="en-US" dirty="0" err="1" smtClean="0"/>
-              <a:t>scnd</a:t>
-            </a:r>
-            <a:r>
-              <a:rPr lang="en-US" dirty="0" smtClean="0"/>
-              <a:t> = [</a:t>
-            </a:r>
-            <a:r>
-              <a:rPr lang="en-US" dirty="0" err="1" smtClean="0"/>
-              <a:t>num</a:t>
-            </a:r>
-            <a:r>
-              <a:rPr lang="en-US" dirty="0" smtClean="0"/>
-              <a:t> for </a:t>
-            </a:r>
-            <a:r>
-              <a:rPr lang="en-US" dirty="0" err="1" smtClean="0"/>
-              <a:t>num</a:t>
-            </a:r>
-            <a:r>
-              <a:rPr lang="en-US" dirty="0" smtClean="0"/>
-              <a:t> in </a:t>
-            </a:r>
-            <a:r>
-              <a:rPr lang="en-US" dirty="0" err="1" smtClean="0"/>
-              <a:t>xrange</a:t>
-            </a:r>
-            <a:r>
-              <a:rPr lang="en-US" dirty="0" smtClean="0"/>
-              <a:t>(101) if </a:t>
-            </a:r>
-            <a:r>
-              <a:rPr lang="en-US" dirty="0" err="1" smtClean="0"/>
-              <a:t>num</a:t>
-            </a:r>
-            <a:r>
-              <a:rPr lang="en-US" dirty="0" smtClean="0"/>
-              <a:t> % 2 == 0] </a:t>
-            </a:r>
-            <a:endParaRPr lang="en-US" dirty="0"/>
-          </a:p>
-        </p:txBody>
-      </p:sp>
-    </p:spTree>
-    <p:extLst>
-      <p:ext uri="{BB962C8B-B14F-4D97-AF65-F5344CB8AC3E}">
-        <p14:creationId xmlns:p14="http://schemas.microsoft.com/office/powerpoint/2010/main" val="1588554858"/>
-      </p:ext>
-    </p:extLst>
-  </p:cSld>
-  <p:clrMapOvr>
-    <a:masterClrMapping/>
-  </p:clrMapOvr>
-</p:sld>
-</file>
-
-<file path=ppt/slides/slide21.xml><?xml version="1.0" encoding="utf-8"?>
-<p:sld xmlns:a="http://schemas.openxmlformats.org/drawingml/2006/main" xmlns:r="http://schemas.openxmlformats.org/officeDocument/2006/relationships" xmlns:p="http://schemas.openxmlformats.org/presentationml/2006/main">
-  <p:cSld>
-    <p:spTree>
-      <p:nvGrpSpPr>
-        <p:cNvPr id="1" name=""/>
-        <p:cNvGrpSpPr/>
-        <p:nvPr/>
-      </p:nvGrpSpPr>
-      <p:grpSpPr>
-        <a:xfrm>
-          <a:off x="0" y="0"/>
-          <a:ext cx="0" cy="0"/>
-          <a:chOff x="0" y="0"/>
-          <a:chExt cx="0" cy="0"/>
-        </a:xfrm>
-      </p:grpSpPr>
-      <p:sp>
-        <p:nvSpPr>
-          <p:cNvPr id="2" name="Title 1"/>
-          <p:cNvSpPr>
-            <a:spLocks noGrp="1"/>
-          </p:cNvSpPr>
-          <p:nvPr>
-            <p:ph type="title"/>
-          </p:nvPr>
-        </p:nvSpPr>
-        <p:spPr/>
-        <p:txBody>
-          <a:bodyPr/>
-          <a:lstStyle/>
-          <a:p>
-            <a:r>
-              <a:rPr lang="en-US" dirty="0" smtClean="0"/>
-              <a:t>Classes, Objects, Functions</a:t>
-            </a:r>
-            <a:endParaRPr lang="en-US" dirty="0"/>
-          </a:p>
-        </p:txBody>
-      </p:sp>
-      <p:sp>
-        <p:nvSpPr>
-          <p:cNvPr id="3" name="Content Placeholder 2"/>
-          <p:cNvSpPr>
-            <a:spLocks noGrp="1"/>
-          </p:cNvSpPr>
-          <p:nvPr>
-            <p:ph idx="1"/>
-          </p:nvPr>
-        </p:nvSpPr>
-        <p:spPr/>
-        <p:txBody>
-          <a:bodyPr>
-            <a:normAutofit fontScale="77500" lnSpcReduction="20000"/>
-          </a:bodyPr>
-          <a:lstStyle/>
-          <a:p>
-            <a:r>
-              <a:rPr lang="en-US" dirty="0" smtClean="0"/>
-              <a:t>Class (A description of something that can be created)</a:t>
-            </a:r>
-            <a:endParaRPr lang="en-US" dirty="0"/>
-          </a:p>
-          <a:p>
-            <a:pPr lvl="1"/>
-            <a:r>
-              <a:rPr lang="en-US" dirty="0" smtClean="0"/>
-              <a:t>NOTHING IS PRIVATE!</a:t>
-            </a:r>
-          </a:p>
-          <a:p>
-            <a:pPr lvl="1"/>
-            <a:r>
-              <a:rPr lang="en-US" dirty="0" smtClean="0"/>
-              <a:t>Attributes </a:t>
-            </a:r>
-            <a:r>
-              <a:rPr lang="en-US" dirty="0" err="1"/>
-              <a:t>a.k.a</a:t>
-            </a:r>
-            <a:r>
-              <a:rPr lang="en-US" dirty="0"/>
-              <a:t> </a:t>
-            </a:r>
-            <a:r>
-              <a:rPr lang="en-US" dirty="0" smtClean="0"/>
-              <a:t>Fields</a:t>
-            </a:r>
-          </a:p>
-          <a:p>
-            <a:pPr lvl="2"/>
-            <a:r>
-              <a:rPr lang="en-US" dirty="0" smtClean="0"/>
-              <a:t>Can be defined explicitly</a:t>
-            </a:r>
-          </a:p>
-          <a:p>
-            <a:pPr lvl="2"/>
-            <a:r>
-              <a:rPr lang="en-US" dirty="0" smtClean="0"/>
-              <a:t>Can be defined in the construction (__</a:t>
-            </a:r>
-            <a:r>
-              <a:rPr lang="en-US" dirty="0" err="1" smtClean="0"/>
-              <a:t>init</a:t>
-            </a:r>
-            <a:r>
-              <a:rPr lang="en-US" dirty="0" smtClean="0"/>
-              <a:t>__) method</a:t>
-            </a:r>
-          </a:p>
-          <a:p>
-            <a:pPr lvl="3"/>
-            <a:r>
-              <a:rPr lang="en-US" dirty="0" smtClean="0"/>
-              <a:t>If defined in constructor the a child class MUST call it’s parent (super) </a:t>
-            </a:r>
-            <a:r>
-              <a:rPr lang="en-US" smtClean="0"/>
-              <a:t>class constructor</a:t>
-            </a:r>
-            <a:endParaRPr lang="en-US" dirty="0"/>
-          </a:p>
-          <a:p>
-            <a:pPr lvl="1"/>
-            <a:r>
-              <a:rPr lang="en-US" dirty="0"/>
-              <a:t>Constructor (__</a:t>
-            </a:r>
-            <a:r>
-              <a:rPr lang="en-US" dirty="0" err="1"/>
-              <a:t>init</a:t>
-            </a:r>
-            <a:r>
-              <a:rPr lang="en-US" dirty="0"/>
-              <a:t>__)/Destructor (__del__)</a:t>
-            </a:r>
-          </a:p>
-          <a:p>
-            <a:pPr lvl="1"/>
-            <a:r>
-              <a:rPr lang="en-US" dirty="0" smtClean="0"/>
-              <a:t>Methods</a:t>
-            </a:r>
-            <a:endParaRPr lang="en-US" dirty="0"/>
-          </a:p>
-          <a:p>
-            <a:r>
-              <a:rPr lang="en-US" dirty="0" smtClean="0"/>
-              <a:t>Objects (Instantiation of a Class)</a:t>
-            </a:r>
-            <a:endParaRPr lang="en-US" dirty="0"/>
-          </a:p>
-          <a:p>
-            <a:r>
-              <a:rPr lang="en-US" dirty="0"/>
-              <a:t>Functions</a:t>
-            </a:r>
-          </a:p>
-          <a:p>
-            <a:pPr lvl="1"/>
-            <a:r>
-              <a:rPr lang="en-US" dirty="0"/>
-              <a:t>Scope</a:t>
-            </a:r>
-          </a:p>
-          <a:p>
-            <a:pPr lvl="1"/>
-            <a:r>
-              <a:rPr lang="en-US" dirty="0" smtClean="0"/>
-              <a:t>Parameters</a:t>
-            </a:r>
-          </a:p>
-          <a:p>
-            <a:pPr lvl="2"/>
-            <a:r>
-              <a:rPr lang="en-US" dirty="0" smtClean="0"/>
-              <a:t>*</a:t>
-            </a:r>
-            <a:r>
-              <a:rPr lang="en-US" dirty="0" err="1" smtClean="0"/>
-              <a:t>args</a:t>
-            </a:r>
-            <a:r>
-              <a:rPr lang="en-US" dirty="0" smtClean="0"/>
-              <a:t>: unlabeled arguments</a:t>
-            </a:r>
-          </a:p>
-          <a:p>
-            <a:pPr lvl="2"/>
-            <a:r>
-              <a:rPr lang="en-US" dirty="0" smtClean="0"/>
-              <a:t>**</a:t>
-            </a:r>
-            <a:r>
-              <a:rPr lang="en-US" dirty="0" err="1" smtClean="0"/>
-              <a:t>kwargs</a:t>
-            </a:r>
-            <a:r>
-              <a:rPr lang="en-US" dirty="0" smtClean="0"/>
-              <a:t>: labeled arguments</a:t>
-            </a:r>
-            <a:endParaRPr lang="en-US" dirty="0"/>
-          </a:p>
-          <a:p>
-            <a:endParaRPr lang="en-US" dirty="0"/>
-          </a:p>
-        </p:txBody>
-      </p:sp>
-    </p:spTree>
-    <p:extLst>
-      <p:ext uri="{BB962C8B-B14F-4D97-AF65-F5344CB8AC3E}">
-        <p14:creationId xmlns:p14="http://schemas.microsoft.com/office/powerpoint/2010/main" val="479699744"/>
-      </p:ext>
-    </p:extLst>
-  </p:cSld>
-  <p:clrMapOvr>
-    <a:masterClrMapping/>
-  </p:clrMapOvr>
-</p:sld>
-</file>
-
-<file path=ppt/slides/slide22.xml><?xml version="1.0" encoding="utf-8"?>
-<p:sld xmlns:a="http://schemas.openxmlformats.org/drawingml/2006/main" xmlns:r="http://schemas.openxmlformats.org/officeDocument/2006/relationships" xmlns:p="http://schemas.openxmlformats.org/presentationml/2006/main">
-  <p:cSld>
-    <p:spTree>
-      <p:nvGrpSpPr>
-        <p:cNvPr id="1" name=""/>
-        <p:cNvGrpSpPr/>
-        <p:nvPr/>
-      </p:nvGrpSpPr>
-      <p:grpSpPr>
-        <a:xfrm>
-          <a:off x="0" y="0"/>
-          <a:ext cx="0" cy="0"/>
-          <a:chOff x="0" y="0"/>
-          <a:chExt cx="0" cy="0"/>
-        </a:xfrm>
-      </p:grpSpPr>
-      <p:sp>
-        <p:nvSpPr>
-          <p:cNvPr id="2" name="Title 1"/>
-          <p:cNvSpPr>
-            <a:spLocks noGrp="1"/>
-          </p:cNvSpPr>
-          <p:nvPr>
-            <p:ph type="title"/>
-          </p:nvPr>
-        </p:nvSpPr>
-        <p:spPr/>
-        <p:txBody>
-          <a:bodyPr/>
-          <a:lstStyle/>
-          <a:p>
-            <a:r>
-              <a:rPr lang="en-US" dirty="0" smtClean="0"/>
-              <a:t>Function Definition</a:t>
-            </a:r>
-            <a:endParaRPr lang="en-US" dirty="0"/>
-          </a:p>
-        </p:txBody>
-      </p:sp>
-      <p:sp>
-        <p:nvSpPr>
-          <p:cNvPr id="3" name="Content Placeholder 2"/>
-          <p:cNvSpPr>
-            <a:spLocks noGrp="1"/>
-          </p:cNvSpPr>
-          <p:nvPr>
-            <p:ph idx="1"/>
-          </p:nvPr>
-        </p:nvSpPr>
-        <p:spPr/>
-        <p:txBody>
-          <a:bodyPr/>
-          <a:lstStyle/>
-          <a:p>
-            <a:r>
-              <a:rPr lang="en-US" dirty="0" smtClean="0"/>
-              <a:t>A method NOT associated with a class</a:t>
-            </a:r>
-          </a:p>
-          <a:p>
-            <a:r>
-              <a:rPr lang="en-US" dirty="0" smtClean="0"/>
-              <a:t>Uses the same syntax</a:t>
-            </a:r>
-            <a:endParaRPr lang="en-US" dirty="0"/>
-          </a:p>
-        </p:txBody>
-      </p:sp>
-    </p:spTree>
-    <p:extLst>
-      <p:ext uri="{BB962C8B-B14F-4D97-AF65-F5344CB8AC3E}">
-        <p14:creationId xmlns:p14="http://schemas.microsoft.com/office/powerpoint/2010/main" val="2160672038"/>
-      </p:ext>
-    </p:extLst>
-  </p:cSld>
-  <p:clrMapOvr>
-    <a:masterClrMapping/>
-  </p:clrMapOvr>
-</p:sld>
-</file>
-
-<file path=ppt/slides/slide23.xml><?xml version="1.0" encoding="utf-8"?>
-<p:sld xmlns:a="http://schemas.openxmlformats.org/drawingml/2006/main" xmlns:r="http://schemas.openxmlformats.org/officeDocument/2006/relationships" xmlns:p="http://schemas.openxmlformats.org/presentationml/2006/main">
-  <p:cSld>
-    <p:spTree>
-      <p:nvGrpSpPr>
-        <p:cNvPr id="1" name=""/>
-        <p:cNvGrpSpPr/>
-        <p:nvPr/>
-      </p:nvGrpSpPr>
-      <p:grpSpPr>
-        <a:xfrm>
-          <a:off x="0" y="0"/>
-          <a:ext cx="0" cy="0"/>
-          <a:chOff x="0" y="0"/>
-          <a:chExt cx="0" cy="0"/>
-        </a:xfrm>
-      </p:grpSpPr>
-      <p:sp>
-        <p:nvSpPr>
-          <p:cNvPr id="2" name="Title 1"/>
-          <p:cNvSpPr>
-            <a:spLocks noGrp="1"/>
-          </p:cNvSpPr>
-          <p:nvPr>
-            <p:ph type="title"/>
-          </p:nvPr>
-        </p:nvSpPr>
-        <p:spPr/>
-        <p:txBody>
-          <a:bodyPr/>
-          <a:lstStyle/>
-          <a:p>
-            <a:r>
-              <a:rPr lang="en-US" dirty="0" smtClean="0"/>
-              <a:t>Conclusion </a:t>
-            </a:r>
-            <a:br>
-              <a:rPr lang="en-US" dirty="0" smtClean="0"/>
-            </a:br>
-            <a:r>
-              <a:rPr lang="en-US" sz="3200" dirty="0" smtClean="0"/>
-              <a:t>(you never thought I would shut up did you?)</a:t>
-            </a:r>
-            <a:endParaRPr lang="en-US" sz="3200" dirty="0"/>
-          </a:p>
-        </p:txBody>
-      </p:sp>
-      <p:sp>
-        <p:nvSpPr>
-          <p:cNvPr id="3" name="Content Placeholder 2"/>
-          <p:cNvSpPr>
-            <a:spLocks noGrp="1"/>
-          </p:cNvSpPr>
-          <p:nvPr>
-            <p:ph idx="1"/>
-          </p:nvPr>
-        </p:nvSpPr>
-        <p:spPr/>
-        <p:txBody>
-          <a:bodyPr/>
-          <a:lstStyle/>
-          <a:p>
-            <a:r>
-              <a:rPr lang="en-US" dirty="0" smtClean="0"/>
-              <a:t>Python is ridiculously flexible, but that requires your diligence.</a:t>
-            </a:r>
-          </a:p>
-          <a:p>
-            <a:pPr marL="0" indent="0">
-              <a:buNone/>
-            </a:pPr>
-            <a:endParaRPr lang="en-US" dirty="0" smtClean="0"/>
-          </a:p>
-          <a:p>
-            <a:r>
-              <a:rPr lang="en-US" dirty="0" smtClean="0"/>
-              <a:t>Recommended on-line resources</a:t>
-            </a:r>
-          </a:p>
-          <a:p>
-            <a:pPr lvl="1"/>
-            <a:r>
-              <a:rPr lang="en-US" dirty="0" smtClean="0">
-                <a:hlinkClick r:id="rId2"/>
-              </a:rPr>
-              <a:t>www.python.org</a:t>
-            </a:r>
-            <a:endParaRPr lang="en-US" dirty="0" smtClean="0"/>
-          </a:p>
-          <a:p>
-            <a:pPr lvl="1"/>
-            <a:r>
-              <a:rPr lang="en-US" dirty="0" smtClean="0">
-                <a:hlinkClick r:id="rId3"/>
-              </a:rPr>
-              <a:t>www.stackoverflow.com</a:t>
-            </a:r>
-            <a:endParaRPr lang="en-US" dirty="0" smtClean="0"/>
-          </a:p>
-          <a:p>
-            <a:pPr lvl="1"/>
-            <a:r>
-              <a:rPr lang="en-US" dirty="0" smtClean="0"/>
-              <a:t>Udemy.com (On-line training site)</a:t>
-            </a:r>
-          </a:p>
-          <a:p>
-            <a:pPr lvl="2"/>
-            <a:r>
-              <a:rPr lang="en-US" b="1" dirty="0"/>
-              <a:t>Complete Python Bootcamp: Go from zero to hero in Python</a:t>
-            </a:r>
-          </a:p>
-          <a:p>
-            <a:pPr marL="914400" lvl="2" indent="0">
-              <a:buNone/>
-            </a:pPr>
-            <a:endParaRPr lang="en-US" dirty="0"/>
-          </a:p>
-        </p:txBody>
-      </p:sp>
-    </p:spTree>
-    <p:extLst>
-      <p:ext uri="{BB962C8B-B14F-4D97-AF65-F5344CB8AC3E}">
-        <p14:creationId xmlns:p14="http://schemas.microsoft.com/office/powerpoint/2010/main" val="3048751577"/>
-      </p:ext>
-    </p:extLst>
-  </p:cSld>
-  <p:clrMapOvr>
-    <a:masterClrMapping/>
-  </p:clrMapOvr>
 </p:sld>
 </file>
 
@@ -8987,13 +7353,6 @@
             </a:r>
           </a:p>
           <a:p>
-            <a:pPr lvl="1"/>
-            <a:r>
-              <a:rPr lang="en-US" dirty="0" smtClean="0"/>
-              <a:t>‘C’ is used for near real-time interactions with physical devices.</a:t>
-            </a:r>
-          </a:p>
-          <a:p>
             <a:r>
               <a:rPr lang="en-US" dirty="0" smtClean="0"/>
               <a:t>Processor is extremely slow</a:t>
@@ -9139,7 +7498,7 @@
             </a:r>
             <a:r>
               <a:rPr lang="en-US" dirty="0" smtClean="0"/>
-              <a:t>“types/classes”</a:t>
+              <a:t>“types”</a:t>
             </a:r>
           </a:p>
           <a:p>
@@ -9594,7 +7953,7 @@
         <p:spPr/>
         <p:txBody>
           <a:bodyPr>
-            <a:normAutofit fontScale="70000" lnSpcReduction="20000"/>
+            <a:normAutofit fontScale="77500" lnSpcReduction="20000"/>
           </a:bodyPr>
           <a:lstStyle/>
           <a:p>
@@ -9607,7 +7966,7 @@
             <a:pPr lvl="1"/>
             <a:r>
               <a:rPr lang="en-US" dirty="0" smtClean="0"/>
-              <a:t>Using IDLE -Select the appropriate version:</a:t>
+              <a:t>Select the appropriate version:</a:t>
             </a:r>
           </a:p>
           <a:p>
@@ -9635,24 +7994,8 @@
           <a:p>
             <a:pPr lvl="2"/>
             <a:r>
-              <a:rPr lang="en-US" dirty="0">
-                <a:hlinkClick r:id="rId3"/>
-              </a:rPr>
-              <a:t>https://www.python.org/downloads/release/python-354</a:t>
-            </a:r>
-            <a:r>
-              <a:rPr lang="en-US" dirty="0" smtClean="0">
-                <a:hlinkClick r:id="rId3"/>
-              </a:rPr>
-              <a:t>/</a:t>
-            </a:r>
-            <a:endParaRPr lang="en-US" dirty="0" smtClean="0"/>
-          </a:p>
-          <a:p>
-            <a:pPr lvl="1"/>
-            <a:r>
-              <a:rPr lang="en-US" smtClean="0"/>
-              <a:t>You can install in Ubuntu for Windows IF you have the Windows 10 Creator Update</a:t>
+              <a:rPr lang="en-US" dirty="0"/>
+              <a:t>https://www.python.org/downloads/release/python-354/</a:t>
             </a:r>
             <a:endParaRPr lang="en-US" dirty="0" smtClean="0"/>
           </a:p>
@@ -9831,7 +8174,7 @@
           <a:p>
             <a:r>
               <a:rPr lang="en-US" dirty="0" smtClean="0"/>
-              <a:t>How to Use</a:t>
+              <a:t>Development Environments</a:t>
             </a:r>
             <a:endParaRPr lang="en-US" dirty="0"/>
           </a:p>
@@ -9847,144 +8190,96 @@
             <p:ph idx="1"/>
           </p:nvPr>
         </p:nvSpPr>
-        <p:spPr>
-          <a:xfrm>
-            <a:off x="1103312" y="1504336"/>
-            <a:ext cx="8946541" cy="4744064"/>
-          </a:xfrm>
-        </p:spPr>
-        <p:txBody>
-          <a:bodyPr>
-            <a:normAutofit fontScale="92500" lnSpcReduction="10000"/>
-          </a:bodyPr>
-          <a:lstStyle/>
-          <a:p>
-            <a:r>
-              <a:rPr lang="en-US" dirty="0" smtClean="0"/>
-              <a:t>Interactive – type ‘python’ on the command line</a:t>
+        <p:spPr/>
+        <p:txBody>
+          <a:bodyPr/>
+          <a:lstStyle/>
+          <a:p>
+            <a:r>
+              <a:rPr lang="en-US" dirty="0" smtClean="0"/>
+              <a:t>IDLE – included with Windows and Mac distributions</a:t>
             </a:r>
           </a:p>
           <a:p>
             <a:pPr lvl="1"/>
             <a:r>
               <a:rPr lang="en-US" dirty="0" smtClean="0"/>
-              <a:t>Not typically used.</a:t>
-            </a:r>
-          </a:p>
-          <a:p>
-            <a:pPr lvl="1"/>
-            <a:r>
-              <a:rPr lang="en-US" dirty="0" smtClean="0"/>
-              <a:t>Allows you to test code fragments</a:t>
-            </a:r>
-          </a:p>
-          <a:p>
-            <a:r>
-              <a:rPr lang="en-US" dirty="0" smtClean="0"/>
-              <a:t>Script</a:t>
-            </a:r>
-          </a:p>
-          <a:p>
-            <a:pPr lvl="1"/>
-            <a:r>
-              <a:rPr lang="en-US" dirty="0" smtClean="0"/>
-              <a:t>Runs the same way as other scripts</a:t>
-            </a:r>
-          </a:p>
-          <a:p>
-            <a:pPr lvl="2"/>
-            <a:r>
-              <a:rPr lang="en-US" dirty="0" smtClean="0"/>
-              <a:t>python script.py</a:t>
-            </a:r>
-          </a:p>
-          <a:p>
-            <a:pPr lvl="2"/>
+              <a:t>Good enough for fairly simple things, including this course</a:t>
+            </a:r>
+          </a:p>
+          <a:p>
+            <a:pPr marL="400050"/>
+            <a:r>
+              <a:rPr lang="en-US" dirty="0" err="1" smtClean="0"/>
+              <a:t>PyCharm</a:t>
+            </a:r>
+            <a:r>
+              <a:rPr lang="en-US" dirty="0" smtClean="0"/>
+              <a:t> – Community edition</a:t>
+            </a:r>
+          </a:p>
+          <a:p>
+            <a:pPr marL="800100" lvl="1"/>
+            <a:r>
+              <a:rPr lang="en-US" dirty="0" smtClean="0"/>
+              <a:t>Shares basic structure with other Jet Brains IDEs</a:t>
+            </a:r>
+          </a:p>
+          <a:p>
+            <a:pPr marL="1200150" lvl="2"/>
+            <a:r>
+              <a:rPr lang="en-US" dirty="0" err="1" smtClean="0"/>
+              <a:t>Intelli</a:t>
+            </a:r>
+            <a:r>
+              <a:rPr lang="en-US" dirty="0" smtClean="0"/>
+              <a:t>-J </a:t>
+            </a:r>
             <a:r>
               <a:rPr lang="en-US" dirty="0"/>
-              <a:t>s</a:t>
-            </a:r>
-            <a:r>
-              <a:rPr lang="en-US" dirty="0" smtClean="0"/>
-              <a:t>cript.py</a:t>
-            </a:r>
-          </a:p>
-          <a:p>
-            <a:pPr lvl="3"/>
-            <a:r>
-              <a:rPr lang="en-US" dirty="0" smtClean="0"/>
-              <a:t>Typical Unix/Linux first line of file must be: #!/bin/python</a:t>
-            </a:r>
-          </a:p>
-          <a:p>
-            <a:r>
-              <a:rPr lang="en-US" dirty="0" smtClean="0"/>
-              <a:t>Command line</a:t>
-            </a:r>
-          </a:p>
-          <a:p>
-            <a:pPr lvl="1"/>
-            <a:r>
-              <a:rPr lang="en-US" dirty="0" smtClean="0"/>
-              <a:t>Python –c “lambda expression”</a:t>
-            </a:r>
-          </a:p>
-          <a:p>
-            <a:pPr lvl="1"/>
-            <a:r>
-              <a:rPr lang="en-US" dirty="0" smtClean="0"/>
-              <a:t>Example:</a:t>
-            </a:r>
-          </a:p>
-          <a:p>
-            <a:pPr marL="914400" lvl="2" indent="0">
-              <a:buNone/>
-            </a:pPr>
-            <a:r>
-              <a:rPr lang="en-US" dirty="0" smtClean="0"/>
-              <a:t>curl –X GET </a:t>
-            </a:r>
-            <a:r>
-              <a:rPr lang="en-US" dirty="0" smtClean="0">
-                <a:hlinkClick r:id="rId2"/>
-              </a:rPr>
-              <a:t>http://ipaddr/api/powerpack</a:t>
-            </a:r>
-            <a:r>
-              <a:rPr lang="en-US" dirty="0" smtClean="0"/>
-              <a:t> | python -c “import </a:t>
-            </a:r>
+              <a:t>(</a:t>
+            </a:r>
+            <a:r>
+              <a:rPr lang="en-US" dirty="0" smtClean="0"/>
+              <a:t>Android and other Java development)</a:t>
+            </a:r>
+          </a:p>
+          <a:p>
+            <a:pPr marL="1200150" lvl="2"/>
             <a:r>
               <a:rPr lang="en-US" dirty="0" err="1" smtClean="0"/>
-              <a:t>sys,json,pprint</a:t>
-            </a:r>
-            <a:r>
-              <a:rPr lang="en-US" dirty="0" smtClean="0"/>
-              <a:t>; </a:t>
-            </a:r>
+              <a:t>WebStorm</a:t>
+            </a:r>
+            <a:endParaRPr lang="en-US" dirty="0" smtClean="0"/>
+          </a:p>
+          <a:p>
+            <a:pPr marL="1200150" lvl="2"/>
             <a:r>
               <a:rPr lang="en-US" dirty="0" err="1" smtClean="0"/>
-              <a:t>pprint.pprint</a:t>
-            </a:r>
-            <a:r>
-              <a:rPr lang="en-US" dirty="0" smtClean="0"/>
-              <a:t>(</a:t>
-            </a:r>
+              <a:t>RubyMine</a:t>
+            </a:r>
+            <a:endParaRPr lang="en-US" dirty="0" smtClean="0"/>
+          </a:p>
+          <a:p>
+            <a:pPr marL="1200150" lvl="2"/>
             <a:r>
               <a:rPr lang="en-US" dirty="0" err="1" smtClean="0"/>
-              <a:t>json.load</a:t>
-            </a:r>
-            <a:r>
-              <a:rPr lang="en-US" dirty="0" smtClean="0"/>
-              <a:t>(</a:t>
-            </a:r>
-            <a:r>
-              <a:rPr lang="en-US" dirty="0" err="1" smtClean="0"/>
-              <a:t>sys.stdin</a:t>
-            </a:r>
-            <a:r>
-              <a:rPr lang="en-US" dirty="0" smtClean="0"/>
-              <a:t>))”</a:t>
+              <a:t>AppCode</a:t>
+            </a:r>
+            <a:endParaRPr lang="en-US" dirty="0" smtClean="0"/>
+          </a:p>
+          <a:p>
+            <a:pPr marL="400050"/>
+            <a:r>
+              <a:rPr lang="en-US" dirty="0" smtClean="0"/>
+              <a:t>Investigate other IDEs:</a:t>
+            </a:r>
+          </a:p>
+          <a:p>
+            <a:pPr marL="800100" lvl="1"/>
+            <a:r>
+              <a:rPr lang="en-US" dirty="0" smtClean="0"/>
+              <a:t>https://www.quora.com/What-is-the-best-IDE-for-Python</a:t>
             </a:r>
             <a:endParaRPr lang="en-US" dirty="0"/>
           </a:p>
@@ -9993,7 +8288,7 @@
     </p:spTree>
     <p:extLst>
       <p:ext uri="{BB962C8B-B14F-4D97-AF65-F5344CB8AC3E}">
-        <p14:creationId xmlns:p14="http://schemas.microsoft.com/office/powerpoint/2010/main" val="802316153"/>
+        <p14:creationId xmlns:p14="http://schemas.microsoft.com/office/powerpoint/2010/main" val="3606567790"/>
       </p:ext>
     </p:extLst>
   </p:cSld>

</xml_diff>